<commit_message>
Updated model diagram with Birthday and Nickname
</commit_message>
<xml_diff>
--- a/docs/diagrams/ModelComponentClassDiagram.pptx
+++ b/docs/diagrams/ModelComponentClassDiagram.pptx
@@ -126,6 +126,10 @@
 </p:presentation>
 </file>
 
+<file path=ppt/revisionInfo.xml><?xml version="1.0" encoding="utf-8"?>
+<p1510:revInfo xmlns:a="http://schemas.openxmlformats.org/drawingml/2006/main" xmlns:r="http://schemas.openxmlformats.org/officeDocument/2006/relationships" xmlns:p1510="http://schemas.microsoft.com/office/powerpoint/2015/10/main"/>
+</file>
+
 <file path=ppt/notesMasters/notesMaster1.xml><?xml version="1.0" encoding="utf-8"?>
 <p:notesMaster xmlns:a="http://schemas.openxmlformats.org/drawingml/2006/main" xmlns:r="http://schemas.openxmlformats.org/officeDocument/2006/relationships" xmlns:p="http://schemas.openxmlformats.org/presentationml/2006/main">
   <p:cSld>
@@ -208,7 +212,7 @@
           <a:p>
             <a:fld id="{F5CC4B3F-88C1-4FFA-B1B6-F41C21DC6924}" type="datetimeFigureOut">
               <a:rPr lang="en-US" smtClean="0"/>
-              <a:t>9/4/17</a:t>
+              <a:t>10/18/2017</a:t>
             </a:fld>
             <a:endParaRPr lang="en-US"/>
           </a:p>
@@ -272,38 +276,37 @@
           <a:p>
             <a:pPr lvl="0"/>
             <a:r>
-              <a:rPr lang="en-US" smtClean="0"/>
+              <a:rPr lang="en-US"/>
               <a:t>Click to edit Master text styles</a:t>
             </a:r>
           </a:p>
           <a:p>
             <a:pPr lvl="1"/>
             <a:r>
-              <a:rPr lang="en-US" smtClean="0"/>
+              <a:rPr lang="en-US"/>
               <a:t>Second level</a:t>
             </a:r>
           </a:p>
           <a:p>
             <a:pPr lvl="2"/>
             <a:r>
-              <a:rPr lang="en-US" smtClean="0"/>
+              <a:rPr lang="en-US"/>
               <a:t>Third level</a:t>
             </a:r>
           </a:p>
           <a:p>
             <a:pPr lvl="3"/>
             <a:r>
-              <a:rPr lang="en-US" smtClean="0"/>
+              <a:rPr lang="en-US"/>
               <a:t>Fourth level</a:t>
             </a:r>
           </a:p>
           <a:p>
             <a:pPr lvl="4"/>
             <a:r>
-              <a:rPr lang="en-US" smtClean="0"/>
+              <a:rPr lang="en-US"/>
               <a:t>Fifth level</a:t>
             </a:r>
-            <a:endParaRPr lang="en-US"/>
           </a:p>
         </p:txBody>
       </p:sp>
@@ -514,10 +517,9 @@
           <a:lstStyle/>
           <a:p>
             <a:r>
-              <a:rPr lang="en-US" smtClean="0"/>
+              <a:rPr lang="en-US"/>
               <a:t>Click to edit Master title style</a:t>
             </a:r>
-            <a:endParaRPr lang="en-US"/>
           </a:p>
         </p:txBody>
       </p:sp>
@@ -633,10 +635,9 @@
           </a:lstStyle>
           <a:p>
             <a:r>
-              <a:rPr lang="en-US" smtClean="0"/>
+              <a:rPr lang="en-US"/>
               <a:t>Click to edit Master subtitle style</a:t>
             </a:r>
-            <a:endParaRPr lang="en-US"/>
           </a:p>
         </p:txBody>
       </p:sp>
@@ -657,7 +658,7 @@
           <a:p>
             <a:fld id="{78C97017-6FC3-485B-9764-EAC9E56C1D49}" type="datetimeFigureOut">
               <a:rPr lang="en-US" smtClean="0"/>
-              <a:t>9/4/17</a:t>
+              <a:t>10/18/2017</a:t>
             </a:fld>
             <a:endParaRPr lang="en-US"/>
           </a:p>
@@ -751,10 +752,9 @@
           <a:lstStyle/>
           <a:p>
             <a:r>
-              <a:rPr lang="en-US" smtClean="0"/>
+              <a:rPr lang="en-US"/>
               <a:t>Click to edit Master title style</a:t>
             </a:r>
-            <a:endParaRPr lang="en-US"/>
           </a:p>
         </p:txBody>
       </p:sp>
@@ -775,38 +775,37 @@
           <a:p>
             <a:pPr lvl="0"/>
             <a:r>
-              <a:rPr lang="en-US" smtClean="0"/>
+              <a:rPr lang="en-US"/>
               <a:t>Click to edit Master text styles</a:t>
             </a:r>
           </a:p>
           <a:p>
             <a:pPr lvl="1"/>
             <a:r>
-              <a:rPr lang="en-US" smtClean="0"/>
+              <a:rPr lang="en-US"/>
               <a:t>Second level</a:t>
             </a:r>
           </a:p>
           <a:p>
             <a:pPr lvl="2"/>
             <a:r>
-              <a:rPr lang="en-US" smtClean="0"/>
+              <a:rPr lang="en-US"/>
               <a:t>Third level</a:t>
             </a:r>
           </a:p>
           <a:p>
             <a:pPr lvl="3"/>
             <a:r>
-              <a:rPr lang="en-US" smtClean="0"/>
+              <a:rPr lang="en-US"/>
               <a:t>Fourth level</a:t>
             </a:r>
           </a:p>
           <a:p>
             <a:pPr lvl="4"/>
             <a:r>
-              <a:rPr lang="en-US" smtClean="0"/>
+              <a:rPr lang="en-US"/>
               <a:t>Fifth level</a:t>
             </a:r>
-            <a:endParaRPr lang="en-US"/>
           </a:p>
         </p:txBody>
       </p:sp>
@@ -827,7 +826,7 @@
           <a:p>
             <a:fld id="{78C97017-6FC3-485B-9764-EAC9E56C1D49}" type="datetimeFigureOut">
               <a:rPr lang="en-US" smtClean="0"/>
-              <a:t>9/4/17</a:t>
+              <a:t>10/18/2017</a:t>
             </a:fld>
             <a:endParaRPr lang="en-US"/>
           </a:p>
@@ -926,10 +925,9 @@
           <a:lstStyle/>
           <a:p>
             <a:r>
-              <a:rPr lang="en-US" smtClean="0"/>
+              <a:rPr lang="en-US"/>
               <a:t>Click to edit Master title style</a:t>
             </a:r>
-            <a:endParaRPr lang="en-US"/>
           </a:p>
         </p:txBody>
       </p:sp>
@@ -955,38 +953,37 @@
           <a:p>
             <a:pPr lvl="0"/>
             <a:r>
-              <a:rPr lang="en-US" smtClean="0"/>
+              <a:rPr lang="en-US"/>
               <a:t>Click to edit Master text styles</a:t>
             </a:r>
           </a:p>
           <a:p>
             <a:pPr lvl="1"/>
             <a:r>
-              <a:rPr lang="en-US" smtClean="0"/>
+              <a:rPr lang="en-US"/>
               <a:t>Second level</a:t>
             </a:r>
           </a:p>
           <a:p>
             <a:pPr lvl="2"/>
             <a:r>
-              <a:rPr lang="en-US" smtClean="0"/>
+              <a:rPr lang="en-US"/>
               <a:t>Third level</a:t>
             </a:r>
           </a:p>
           <a:p>
             <a:pPr lvl="3"/>
             <a:r>
-              <a:rPr lang="en-US" smtClean="0"/>
+              <a:rPr lang="en-US"/>
               <a:t>Fourth level</a:t>
             </a:r>
           </a:p>
           <a:p>
             <a:pPr lvl="4"/>
             <a:r>
-              <a:rPr lang="en-US" smtClean="0"/>
+              <a:rPr lang="en-US"/>
               <a:t>Fifth level</a:t>
             </a:r>
-            <a:endParaRPr lang="en-US"/>
           </a:p>
         </p:txBody>
       </p:sp>
@@ -1007,7 +1004,7 @@
           <a:p>
             <a:fld id="{78C97017-6FC3-485B-9764-EAC9E56C1D49}" type="datetimeFigureOut">
               <a:rPr lang="en-US" smtClean="0"/>
-              <a:t>9/4/17</a:t>
+              <a:t>10/18/2017</a:t>
             </a:fld>
             <a:endParaRPr lang="en-US"/>
           </a:p>
@@ -1101,10 +1098,9 @@
           <a:lstStyle/>
           <a:p>
             <a:r>
-              <a:rPr lang="en-US" smtClean="0"/>
+              <a:rPr lang="en-US"/>
               <a:t>Click to edit Master title style</a:t>
             </a:r>
-            <a:endParaRPr lang="en-US"/>
           </a:p>
         </p:txBody>
       </p:sp>
@@ -1125,38 +1121,37 @@
           <a:p>
             <a:pPr lvl="0"/>
             <a:r>
-              <a:rPr lang="en-US" smtClean="0"/>
+              <a:rPr lang="en-US"/>
               <a:t>Click to edit Master text styles</a:t>
             </a:r>
           </a:p>
           <a:p>
             <a:pPr lvl="1"/>
             <a:r>
-              <a:rPr lang="en-US" smtClean="0"/>
+              <a:rPr lang="en-US"/>
               <a:t>Second level</a:t>
             </a:r>
           </a:p>
           <a:p>
             <a:pPr lvl="2"/>
             <a:r>
-              <a:rPr lang="en-US" smtClean="0"/>
+              <a:rPr lang="en-US"/>
               <a:t>Third level</a:t>
             </a:r>
           </a:p>
           <a:p>
             <a:pPr lvl="3"/>
             <a:r>
-              <a:rPr lang="en-US" smtClean="0"/>
+              <a:rPr lang="en-US"/>
               <a:t>Fourth level</a:t>
             </a:r>
           </a:p>
           <a:p>
             <a:pPr lvl="4"/>
             <a:r>
-              <a:rPr lang="en-US" smtClean="0"/>
+              <a:rPr lang="en-US"/>
               <a:t>Fifth level</a:t>
             </a:r>
-            <a:endParaRPr lang="en-US"/>
           </a:p>
         </p:txBody>
       </p:sp>
@@ -1177,7 +1172,7 @@
           <a:p>
             <a:fld id="{78C97017-6FC3-485B-9764-EAC9E56C1D49}" type="datetimeFigureOut">
               <a:rPr lang="en-US" smtClean="0"/>
-              <a:t>9/4/17</a:t>
+              <a:t>10/18/2017</a:t>
             </a:fld>
             <a:endParaRPr lang="en-US"/>
           </a:p>
@@ -1280,10 +1275,9 @@
           </a:lstStyle>
           <a:p>
             <a:r>
-              <a:rPr lang="en-US" smtClean="0"/>
+              <a:rPr lang="en-US"/>
               <a:t>Click to edit Master title style</a:t>
             </a:r>
-            <a:endParaRPr lang="en-US"/>
           </a:p>
         </p:txBody>
       </p:sp>
@@ -1400,7 +1394,7 @@
           <a:p>
             <a:pPr lvl="0"/>
             <a:r>
-              <a:rPr lang="en-US" smtClean="0"/>
+              <a:rPr lang="en-US"/>
               <a:t>Click to edit Master text styles</a:t>
             </a:r>
           </a:p>
@@ -1423,7 +1417,7 @@
           <a:p>
             <a:fld id="{78C97017-6FC3-485B-9764-EAC9E56C1D49}" type="datetimeFigureOut">
               <a:rPr lang="en-US" smtClean="0"/>
-              <a:t>9/4/17</a:t>
+              <a:t>10/18/2017</a:t>
             </a:fld>
             <a:endParaRPr lang="en-US"/>
           </a:p>
@@ -1517,10 +1511,9 @@
           <a:lstStyle/>
           <a:p>
             <a:r>
-              <a:rPr lang="en-US" smtClean="0"/>
+              <a:rPr lang="en-US"/>
               <a:t>Click to edit Master title style</a:t>
             </a:r>
-            <a:endParaRPr lang="en-US"/>
           </a:p>
         </p:txBody>
       </p:sp>
@@ -1574,38 +1567,37 @@
           <a:p>
             <a:pPr lvl="0"/>
             <a:r>
-              <a:rPr lang="en-US" smtClean="0"/>
+              <a:rPr lang="en-US"/>
               <a:t>Click to edit Master text styles</a:t>
             </a:r>
           </a:p>
           <a:p>
             <a:pPr lvl="1"/>
             <a:r>
-              <a:rPr lang="en-US" smtClean="0"/>
+              <a:rPr lang="en-US"/>
               <a:t>Second level</a:t>
             </a:r>
           </a:p>
           <a:p>
             <a:pPr lvl="2"/>
             <a:r>
-              <a:rPr lang="en-US" smtClean="0"/>
+              <a:rPr lang="en-US"/>
               <a:t>Third level</a:t>
             </a:r>
           </a:p>
           <a:p>
             <a:pPr lvl="3"/>
             <a:r>
-              <a:rPr lang="en-US" smtClean="0"/>
+              <a:rPr lang="en-US"/>
               <a:t>Fourth level</a:t>
             </a:r>
           </a:p>
           <a:p>
             <a:pPr lvl="4"/>
             <a:r>
-              <a:rPr lang="en-US" smtClean="0"/>
+              <a:rPr lang="en-US"/>
               <a:t>Fifth level</a:t>
             </a:r>
-            <a:endParaRPr lang="en-US"/>
           </a:p>
         </p:txBody>
       </p:sp>
@@ -1659,38 +1651,37 @@
           <a:p>
             <a:pPr lvl="0"/>
             <a:r>
-              <a:rPr lang="en-US" smtClean="0"/>
+              <a:rPr lang="en-US"/>
               <a:t>Click to edit Master text styles</a:t>
             </a:r>
           </a:p>
           <a:p>
             <a:pPr lvl="1"/>
             <a:r>
-              <a:rPr lang="en-US" smtClean="0"/>
+              <a:rPr lang="en-US"/>
               <a:t>Second level</a:t>
             </a:r>
           </a:p>
           <a:p>
             <a:pPr lvl="2"/>
             <a:r>
-              <a:rPr lang="en-US" smtClean="0"/>
+              <a:rPr lang="en-US"/>
               <a:t>Third level</a:t>
             </a:r>
           </a:p>
           <a:p>
             <a:pPr lvl="3"/>
             <a:r>
-              <a:rPr lang="en-US" smtClean="0"/>
+              <a:rPr lang="en-US"/>
               <a:t>Fourth level</a:t>
             </a:r>
           </a:p>
           <a:p>
             <a:pPr lvl="4"/>
             <a:r>
-              <a:rPr lang="en-US" smtClean="0"/>
+              <a:rPr lang="en-US"/>
               <a:t>Fifth level</a:t>
             </a:r>
-            <a:endParaRPr lang="en-US"/>
           </a:p>
         </p:txBody>
       </p:sp>
@@ -1711,7 +1702,7 @@
           <a:p>
             <a:fld id="{78C97017-6FC3-485B-9764-EAC9E56C1D49}" type="datetimeFigureOut">
               <a:rPr lang="en-US" smtClean="0"/>
-              <a:t>9/4/17</a:t>
+              <a:t>10/18/2017</a:t>
             </a:fld>
             <a:endParaRPr lang="en-US"/>
           </a:p>
@@ -1809,10 +1800,9 @@
           </a:lstStyle>
           <a:p>
             <a:r>
-              <a:rPr lang="en-US" smtClean="0"/>
+              <a:rPr lang="en-US"/>
               <a:t>Click to edit Master title style</a:t>
             </a:r>
-            <a:endParaRPr lang="en-US"/>
           </a:p>
         </p:txBody>
       </p:sp>
@@ -1875,7 +1865,7 @@
           <a:p>
             <a:pPr lvl="0"/>
             <a:r>
-              <a:rPr lang="en-US" smtClean="0"/>
+              <a:rPr lang="en-US"/>
               <a:t>Click to edit Master text styles</a:t>
             </a:r>
           </a:p>
@@ -1931,38 +1921,37 @@
           <a:p>
             <a:pPr lvl="0"/>
             <a:r>
-              <a:rPr lang="en-US" smtClean="0"/>
+              <a:rPr lang="en-US"/>
               <a:t>Click to edit Master text styles</a:t>
             </a:r>
           </a:p>
           <a:p>
             <a:pPr lvl="1"/>
             <a:r>
-              <a:rPr lang="en-US" smtClean="0"/>
+              <a:rPr lang="en-US"/>
               <a:t>Second level</a:t>
             </a:r>
           </a:p>
           <a:p>
             <a:pPr lvl="2"/>
             <a:r>
-              <a:rPr lang="en-US" smtClean="0"/>
+              <a:rPr lang="en-US"/>
               <a:t>Third level</a:t>
             </a:r>
           </a:p>
           <a:p>
             <a:pPr lvl="3"/>
             <a:r>
-              <a:rPr lang="en-US" smtClean="0"/>
+              <a:rPr lang="en-US"/>
               <a:t>Fourth level</a:t>
             </a:r>
           </a:p>
           <a:p>
             <a:pPr lvl="4"/>
             <a:r>
-              <a:rPr lang="en-US" smtClean="0"/>
+              <a:rPr lang="en-US"/>
               <a:t>Fifth level</a:t>
             </a:r>
-            <a:endParaRPr lang="en-US"/>
           </a:p>
         </p:txBody>
       </p:sp>
@@ -2025,7 +2014,7 @@
           <a:p>
             <a:pPr lvl="0"/>
             <a:r>
-              <a:rPr lang="en-US" smtClean="0"/>
+              <a:rPr lang="en-US"/>
               <a:t>Click to edit Master text styles</a:t>
             </a:r>
           </a:p>
@@ -2081,38 +2070,37 @@
           <a:p>
             <a:pPr lvl="0"/>
             <a:r>
-              <a:rPr lang="en-US" smtClean="0"/>
+              <a:rPr lang="en-US"/>
               <a:t>Click to edit Master text styles</a:t>
             </a:r>
           </a:p>
           <a:p>
             <a:pPr lvl="1"/>
             <a:r>
-              <a:rPr lang="en-US" smtClean="0"/>
+              <a:rPr lang="en-US"/>
               <a:t>Second level</a:t>
             </a:r>
           </a:p>
           <a:p>
             <a:pPr lvl="2"/>
             <a:r>
-              <a:rPr lang="en-US" smtClean="0"/>
+              <a:rPr lang="en-US"/>
               <a:t>Third level</a:t>
             </a:r>
           </a:p>
           <a:p>
             <a:pPr lvl="3"/>
             <a:r>
-              <a:rPr lang="en-US" smtClean="0"/>
+              <a:rPr lang="en-US"/>
               <a:t>Fourth level</a:t>
             </a:r>
           </a:p>
           <a:p>
             <a:pPr lvl="4"/>
             <a:r>
-              <a:rPr lang="en-US" smtClean="0"/>
+              <a:rPr lang="en-US"/>
               <a:t>Fifth level</a:t>
             </a:r>
-            <a:endParaRPr lang="en-US"/>
           </a:p>
         </p:txBody>
       </p:sp>
@@ -2133,7 +2121,7 @@
           <a:p>
             <a:fld id="{78C97017-6FC3-485B-9764-EAC9E56C1D49}" type="datetimeFigureOut">
               <a:rPr lang="en-US" smtClean="0"/>
-              <a:t>9/4/17</a:t>
+              <a:t>10/18/2017</a:t>
             </a:fld>
             <a:endParaRPr lang="en-US"/>
           </a:p>
@@ -2227,10 +2215,9 @@
           <a:lstStyle/>
           <a:p>
             <a:r>
-              <a:rPr lang="en-US" smtClean="0"/>
+              <a:rPr lang="en-US"/>
               <a:t>Click to edit Master title style</a:t>
             </a:r>
-            <a:endParaRPr lang="en-US"/>
           </a:p>
         </p:txBody>
       </p:sp>
@@ -2251,7 +2238,7 @@
           <a:p>
             <a:fld id="{78C97017-6FC3-485B-9764-EAC9E56C1D49}" type="datetimeFigureOut">
               <a:rPr lang="en-US" smtClean="0"/>
-              <a:t>9/4/17</a:t>
+              <a:t>10/18/2017</a:t>
             </a:fld>
             <a:endParaRPr lang="en-US"/>
           </a:p>
@@ -2346,7 +2333,7 @@
           <a:p>
             <a:fld id="{78C97017-6FC3-485B-9764-EAC9E56C1D49}" type="datetimeFigureOut">
               <a:rPr lang="en-US" smtClean="0"/>
-              <a:t>9/4/17</a:t>
+              <a:t>10/18/2017</a:t>
             </a:fld>
             <a:endParaRPr lang="en-US"/>
           </a:p>
@@ -2449,10 +2436,9 @@
           </a:lstStyle>
           <a:p>
             <a:r>
-              <a:rPr lang="en-US" smtClean="0"/>
+              <a:rPr lang="en-US"/>
               <a:t>Click to edit Master title style</a:t>
             </a:r>
-            <a:endParaRPr lang="en-US"/>
           </a:p>
         </p:txBody>
       </p:sp>
@@ -2506,38 +2492,37 @@
           <a:p>
             <a:pPr lvl="0"/>
             <a:r>
-              <a:rPr lang="en-US" smtClean="0"/>
+              <a:rPr lang="en-US"/>
               <a:t>Click to edit Master text styles</a:t>
             </a:r>
           </a:p>
           <a:p>
             <a:pPr lvl="1"/>
             <a:r>
-              <a:rPr lang="en-US" smtClean="0"/>
+              <a:rPr lang="en-US"/>
               <a:t>Second level</a:t>
             </a:r>
           </a:p>
           <a:p>
             <a:pPr lvl="2"/>
             <a:r>
-              <a:rPr lang="en-US" smtClean="0"/>
+              <a:rPr lang="en-US"/>
               <a:t>Third level</a:t>
             </a:r>
           </a:p>
           <a:p>
             <a:pPr lvl="3"/>
             <a:r>
-              <a:rPr lang="en-US" smtClean="0"/>
+              <a:rPr lang="en-US"/>
               <a:t>Fourth level</a:t>
             </a:r>
           </a:p>
           <a:p>
             <a:pPr lvl="4"/>
             <a:r>
-              <a:rPr lang="en-US" smtClean="0"/>
+              <a:rPr lang="en-US"/>
               <a:t>Fifth level</a:t>
             </a:r>
-            <a:endParaRPr lang="en-US"/>
           </a:p>
         </p:txBody>
       </p:sp>
@@ -2600,7 +2585,7 @@
           <a:p>
             <a:pPr lvl="0"/>
             <a:r>
-              <a:rPr lang="en-US" smtClean="0"/>
+              <a:rPr lang="en-US"/>
               <a:t>Click to edit Master text styles</a:t>
             </a:r>
           </a:p>
@@ -2623,7 +2608,7 @@
           <a:p>
             <a:fld id="{78C97017-6FC3-485B-9764-EAC9E56C1D49}" type="datetimeFigureOut">
               <a:rPr lang="en-US" smtClean="0"/>
-              <a:t>9/4/17</a:t>
+              <a:t>10/18/2017</a:t>
             </a:fld>
             <a:endParaRPr lang="en-US"/>
           </a:p>
@@ -2726,10 +2711,9 @@
           </a:lstStyle>
           <a:p>
             <a:r>
-              <a:rPr lang="en-US" smtClean="0"/>
+              <a:rPr lang="en-US"/>
               <a:t>Click to edit Master title style</a:t>
             </a:r>
-            <a:endParaRPr lang="en-US"/>
           </a:p>
         </p:txBody>
       </p:sp>
@@ -2853,7 +2837,7 @@
           <a:p>
             <a:pPr lvl="0"/>
             <a:r>
-              <a:rPr lang="en-US" smtClean="0"/>
+              <a:rPr lang="en-US"/>
               <a:t>Click to edit Master text styles</a:t>
             </a:r>
           </a:p>
@@ -2876,7 +2860,7 @@
           <a:p>
             <a:fld id="{78C97017-6FC3-485B-9764-EAC9E56C1D49}" type="datetimeFigureOut">
               <a:rPr lang="en-US" smtClean="0"/>
-              <a:t>9/4/17</a:t>
+              <a:t>10/18/2017</a:t>
             </a:fld>
             <a:endParaRPr lang="en-US"/>
           </a:p>
@@ -2985,10 +2969,9 @@
           <a:lstStyle/>
           <a:p>
             <a:r>
-              <a:rPr lang="en-US" smtClean="0"/>
+              <a:rPr lang="en-US"/>
               <a:t>Click to edit Master title style</a:t>
             </a:r>
-            <a:endParaRPr lang="en-US"/>
           </a:p>
         </p:txBody>
       </p:sp>
@@ -3019,38 +3002,37 @@
           <a:p>
             <a:pPr lvl="0"/>
             <a:r>
-              <a:rPr lang="en-US" smtClean="0"/>
+              <a:rPr lang="en-US"/>
               <a:t>Click to edit Master text styles</a:t>
             </a:r>
           </a:p>
           <a:p>
             <a:pPr lvl="1"/>
             <a:r>
-              <a:rPr lang="en-US" smtClean="0"/>
+              <a:rPr lang="en-US"/>
               <a:t>Second level</a:t>
             </a:r>
           </a:p>
           <a:p>
             <a:pPr lvl="2"/>
             <a:r>
-              <a:rPr lang="en-US" smtClean="0"/>
+              <a:rPr lang="en-US"/>
               <a:t>Third level</a:t>
             </a:r>
           </a:p>
           <a:p>
             <a:pPr lvl="3"/>
             <a:r>
-              <a:rPr lang="en-US" smtClean="0"/>
+              <a:rPr lang="en-US"/>
               <a:t>Fourth level</a:t>
             </a:r>
           </a:p>
           <a:p>
             <a:pPr lvl="4"/>
             <a:r>
-              <a:rPr lang="en-US" smtClean="0"/>
+              <a:rPr lang="en-US"/>
               <a:t>Fifth level</a:t>
             </a:r>
-            <a:endParaRPr lang="en-US"/>
           </a:p>
         </p:txBody>
       </p:sp>
@@ -3089,7 +3071,7 @@
           <a:p>
             <a:fld id="{78C97017-6FC3-485B-9764-EAC9E56C1D49}" type="datetimeFigureOut">
               <a:rPr lang="en-US" smtClean="0"/>
-              <a:t>9/4/17</a:t>
+              <a:t>10/18/2017</a:t>
             </a:fld>
             <a:endParaRPr lang="en-US"/>
           </a:p>
@@ -3510,7 +3492,7 @@
           <a:lstStyle/>
           <a:p>
             <a:r>
-              <a:rPr lang="en-US" sz="1200" b="1" dirty="0" smtClean="0">
+              <a:rPr lang="en-US" sz="1200" b="1" dirty="0">
                 <a:solidFill>
                   <a:srgbClr val="7030A0"/>
                 </a:solidFill>
@@ -3569,7 +3551,7 @@
           <a:p>
             <a:pPr algn="ctr"/>
             <a:r>
-              <a:rPr lang="en-US" sz="1050" dirty="0" err="1" smtClean="0">
+              <a:rPr lang="en-US" sz="1050" dirty="0" err="1">
                 <a:solidFill>
                   <a:schemeClr val="bg1"/>
                 </a:solidFill>
@@ -3628,7 +3610,7 @@
           <a:p>
             <a:pPr algn="ctr"/>
             <a:r>
-              <a:rPr lang="en-US" sz="1050" dirty="0" err="1" smtClean="0">
+              <a:rPr lang="en-US" sz="1050" dirty="0" err="1">
                 <a:solidFill>
                   <a:schemeClr val="bg1"/>
                 </a:solidFill>
@@ -3783,7 +3765,7 @@
           <a:p>
             <a:pPr algn="ctr"/>
             <a:r>
-              <a:rPr lang="en-US" sz="1050" dirty="0" smtClean="0">
+              <a:rPr lang="en-US" sz="1050" dirty="0">
                 <a:solidFill>
                   <a:schemeClr val="bg1"/>
                 </a:solidFill>
@@ -4107,7 +4089,7 @@
           <a:p>
             <a:pPr algn="ctr"/>
             <a:r>
-              <a:rPr lang="en-US" sz="1050" dirty="0" err="1" smtClean="0">
+              <a:rPr lang="en-US" sz="1050" dirty="0" err="1">
                 <a:solidFill>
                   <a:srgbClr val="7030A0"/>
                 </a:solidFill>
@@ -4249,7 +4231,7 @@
           <a:p>
             <a:pPr algn="ctr"/>
             <a:r>
-              <a:rPr lang="en-US" sz="1050" dirty="0" err="1" smtClean="0">
+              <a:rPr lang="en-US" sz="1050" dirty="0" err="1">
                 <a:solidFill>
                   <a:srgbClr val="7030A0"/>
                 </a:solidFill>
@@ -4393,7 +4375,7 @@
           <a:p>
             <a:pPr algn="ctr"/>
             <a:r>
-              <a:rPr lang="en-US" sz="1050" dirty="0" err="1" smtClean="0">
+              <a:rPr lang="en-US" sz="1050" dirty="0" err="1">
                 <a:solidFill>
                   <a:srgbClr val="7030A0"/>
                 </a:solidFill>
@@ -4492,7 +4474,7 @@
           <a:p>
             <a:pPr algn="ctr"/>
             <a:r>
-              <a:rPr lang="en-US" sz="1050" dirty="0" smtClean="0">
+              <a:rPr lang="en-US" sz="1050" dirty="0">
                 <a:solidFill>
                   <a:srgbClr val="7030A0"/>
                 </a:solidFill>
@@ -4634,7 +4616,7 @@
           <a:p>
             <a:pPr algn="ctr"/>
             <a:r>
-              <a:rPr lang="en-US" sz="1050" dirty="0" smtClean="0">
+              <a:rPr lang="en-US" sz="1050" dirty="0">
                 <a:solidFill>
                   <a:srgbClr val="7030A0"/>
                 </a:solidFill>
@@ -4776,7 +4758,7 @@
           <a:p>
             <a:pPr algn="ctr"/>
             <a:r>
-              <a:rPr lang="en-US" sz="1050" dirty="0" smtClean="0">
+              <a:rPr lang="en-US" sz="1050" dirty="0">
                 <a:solidFill>
                   <a:srgbClr val="7030A0"/>
                 </a:solidFill>
@@ -4784,14 +4766,14 @@
               <a:t>&lt;&lt;interface&gt;&gt;</a:t>
             </a:r>
             <a:br>
-              <a:rPr lang="en-US" sz="1050" dirty="0" smtClean="0">
+              <a:rPr lang="en-US" sz="1050" dirty="0">
                 <a:solidFill>
                   <a:srgbClr val="7030A0"/>
                 </a:solidFill>
               </a:rPr>
             </a:br>
             <a:r>
-              <a:rPr lang="en-US" sz="1050" dirty="0" err="1" smtClean="0">
+              <a:rPr lang="en-US" sz="1050" dirty="0" err="1">
                 <a:solidFill>
                   <a:srgbClr val="7030A0"/>
                 </a:solidFill>
@@ -4814,8 +4796,8 @@
         </p:nvSpPr>
         <p:spPr>
           <a:xfrm>
-            <a:off x="7712397" y="2564238"/>
-            <a:ext cx="708186" cy="285783"/>
+            <a:off x="7712396" y="2564238"/>
+            <a:ext cx="745803" cy="285783"/>
           </a:xfrm>
           <a:prstGeom prst="rect">
             <a:avLst/>
@@ -4847,7 +4829,7 @@
           <a:p>
             <a:pPr algn="ctr"/>
             <a:r>
-              <a:rPr lang="en-US" sz="1050" dirty="0" smtClean="0">
+              <a:rPr lang="en-US" sz="1050" dirty="0">
                 <a:solidFill>
                   <a:srgbClr val="7030A0"/>
                 </a:solidFill>
@@ -4913,6 +4895,7 @@
         <p:nvCxnSpPr>
           <p:cNvPr id="79" name="Elbow Connector 78"/>
           <p:cNvCxnSpPr>
+            <a:cxnSpLocks/>
             <a:stCxn id="78" idx="3"/>
             <a:endCxn id="76" idx="1"/>
           </p:cNvCxnSpPr>
@@ -4921,7 +4904,7 @@
         <p:spPr>
           <a:xfrm flipV="1">
             <a:off x="7277995" y="2707130"/>
-            <a:ext cx="434402" cy="327761"/>
+            <a:ext cx="434401" cy="327761"/>
           </a:xfrm>
           <a:prstGeom prst="bentConnector3">
             <a:avLst/>
@@ -4958,8 +4941,8 @@
         </p:nvSpPr>
         <p:spPr>
           <a:xfrm>
-            <a:off x="7712397" y="2887216"/>
-            <a:ext cx="708186" cy="285783"/>
+            <a:off x="7712396" y="2887216"/>
+            <a:ext cx="745803" cy="285783"/>
           </a:xfrm>
           <a:prstGeom prst="rect">
             <a:avLst/>
@@ -4991,7 +4974,7 @@
           <a:p>
             <a:pPr algn="ctr"/>
             <a:r>
-              <a:rPr lang="en-US" sz="1050" dirty="0" smtClean="0">
+              <a:rPr lang="en-US" sz="1050" dirty="0">
                 <a:solidFill>
                   <a:srgbClr val="7030A0"/>
                 </a:solidFill>
@@ -5010,6 +4993,7 @@
         <p:nvCxnSpPr>
           <p:cNvPr id="81" name="Elbow Connector 80"/>
           <p:cNvCxnSpPr>
+            <a:cxnSpLocks/>
             <a:stCxn id="78" idx="3"/>
             <a:endCxn id="80" idx="1"/>
           </p:cNvCxnSpPr>
@@ -5018,7 +5002,7 @@
         <p:spPr>
           <a:xfrm flipV="1">
             <a:off x="7277995" y="3030108"/>
-            <a:ext cx="434402" cy="4783"/>
+            <a:ext cx="434401" cy="4783"/>
           </a:xfrm>
           <a:prstGeom prst="bentConnector3">
             <a:avLst/>
@@ -5055,8 +5039,8 @@
         </p:nvSpPr>
         <p:spPr>
           <a:xfrm>
-            <a:off x="7712397" y="3210194"/>
-            <a:ext cx="708186" cy="285783"/>
+            <a:off x="7712396" y="3210194"/>
+            <a:ext cx="745803" cy="285783"/>
           </a:xfrm>
           <a:prstGeom prst="rect">
             <a:avLst/>
@@ -5088,7 +5072,7 @@
           <a:p>
             <a:pPr algn="ctr"/>
             <a:r>
-              <a:rPr lang="en-US" sz="1050" dirty="0" smtClean="0">
+              <a:rPr lang="en-US" sz="1050" dirty="0">
                 <a:solidFill>
                   <a:srgbClr val="7030A0"/>
                 </a:solidFill>
@@ -5107,6 +5091,7 @@
         <p:nvCxnSpPr>
           <p:cNvPr id="84" name="Elbow Connector 83"/>
           <p:cNvCxnSpPr>
+            <a:cxnSpLocks/>
             <a:stCxn id="78" idx="3"/>
             <a:endCxn id="83" idx="1"/>
           </p:cNvCxnSpPr>
@@ -5115,7 +5100,7 @@
         <p:spPr>
           <a:xfrm>
             <a:off x="7277995" y="3034891"/>
-            <a:ext cx="434402" cy="318195"/>
+            <a:ext cx="434401" cy="318195"/>
           </a:xfrm>
           <a:prstGeom prst="bentConnector3">
             <a:avLst/>
@@ -5152,8 +5137,8 @@
         </p:nvSpPr>
         <p:spPr>
           <a:xfrm>
-            <a:off x="7712397" y="3533171"/>
-            <a:ext cx="708186" cy="285783"/>
+            <a:off x="7712396" y="3533171"/>
+            <a:ext cx="745803" cy="285783"/>
           </a:xfrm>
           <a:prstGeom prst="rect">
             <a:avLst/>
@@ -5185,7 +5170,7 @@
           <a:p>
             <a:pPr algn="ctr"/>
             <a:r>
-              <a:rPr lang="en-US" sz="1050" dirty="0" smtClean="0">
+              <a:rPr lang="en-US" sz="1050" dirty="0">
                 <a:solidFill>
                   <a:srgbClr val="7030A0"/>
                 </a:solidFill>
@@ -5204,6 +5189,7 @@
         <p:nvCxnSpPr>
           <p:cNvPr id="86" name="Elbow Connector 85"/>
           <p:cNvCxnSpPr>
+            <a:cxnSpLocks/>
             <a:stCxn id="78" idx="3"/>
             <a:endCxn id="85" idx="1"/>
           </p:cNvCxnSpPr>
@@ -5212,7 +5198,7 @@
         <p:spPr>
           <a:xfrm>
             <a:off x="7277995" y="3034891"/>
-            <a:ext cx="434402" cy="641172"/>
+            <a:ext cx="434401" cy="641172"/>
           </a:xfrm>
           <a:prstGeom prst="bentConnector3">
             <a:avLst/>
@@ -5373,7 +5359,7 @@
           <a:p>
             <a:pPr algn="ctr"/>
             <a:r>
-              <a:rPr lang="en-US" sz="1050" dirty="0" smtClean="0">
+              <a:rPr lang="en-US" sz="1050" dirty="0">
                 <a:solidFill>
                   <a:srgbClr val="7030A0"/>
                 </a:solidFill>
@@ -5381,14 +5367,14 @@
               <a:t>&lt;&lt;interface&gt;&gt;</a:t>
             </a:r>
             <a:br>
-              <a:rPr lang="en-US" sz="1050" dirty="0" smtClean="0">
+              <a:rPr lang="en-US" sz="1050" dirty="0">
                 <a:solidFill>
                   <a:srgbClr val="7030A0"/>
                 </a:solidFill>
               </a:rPr>
             </a:br>
             <a:r>
-              <a:rPr lang="en-US" sz="1050" dirty="0" err="1" smtClean="0">
+              <a:rPr lang="en-US" sz="1050" dirty="0" err="1">
                 <a:solidFill>
                   <a:srgbClr val="7030A0"/>
                 </a:solidFill>
@@ -5427,7 +5413,7 @@
           <a:p>
             <a:pPr algn="r"/>
             <a:r>
-              <a:rPr lang="en-US" sz="1100" dirty="0" smtClean="0">
+              <a:rPr lang="en-US" sz="1100" dirty="0">
                 <a:solidFill>
                   <a:srgbClr val="7030A0"/>
                 </a:solidFill>
@@ -5483,20 +5469,12 @@
           <a:p>
             <a:pPr algn="ctr"/>
             <a:r>
-              <a:rPr lang="en-US" sz="1050" dirty="0" smtClean="0">
+              <a:rPr lang="en-US" sz="1050" dirty="0">
                 <a:solidFill>
                   <a:srgbClr val="7030A0"/>
                 </a:solidFill>
               </a:rPr>
               <a:t>&lt;&lt;interface&gt;&gt;</a:t>
-            </a:r>
-            <a:r>
-              <a:rPr lang="en-US" sz="1050">
-                <a:solidFill>
-                  <a:srgbClr val="7030A0"/>
-                </a:solidFill>
-              </a:rPr>
-              <a:t/>
             </a:r>
             <a:br>
               <a:rPr lang="en-US" sz="1050">
@@ -5506,7 +5484,7 @@
               </a:rPr>
             </a:br>
             <a:r>
-              <a:rPr lang="en-US" sz="1050" dirty="0" err="1" smtClean="0">
+              <a:rPr lang="en-US" sz="1050" dirty="0" err="1">
                 <a:solidFill>
                   <a:srgbClr val="7030A0"/>
                 </a:solidFill>
@@ -5628,7 +5606,7 @@
           <a:p>
             <a:pPr algn="ctr"/>
             <a:r>
-              <a:rPr lang="en-US" sz="1100" dirty="0" smtClean="0">
+              <a:rPr lang="en-US" sz="1100" dirty="0">
                 <a:solidFill>
                   <a:srgbClr val="7030A0"/>
                 </a:solidFill>
@@ -5667,7 +5645,7 @@
           <a:p>
             <a:pPr algn="ctr"/>
             <a:r>
-              <a:rPr lang="en-US" sz="1100" dirty="0" smtClean="0">
+              <a:rPr lang="en-US" sz="1100" dirty="0">
                 <a:solidFill>
                   <a:srgbClr val="7030A0"/>
                 </a:solidFill>
@@ -5706,7 +5684,7 @@
           <a:p>
             <a:pPr algn="ctr"/>
             <a:r>
-              <a:rPr lang="en-US" sz="1100" dirty="0" smtClean="0">
+              <a:rPr lang="en-US" sz="1100" dirty="0">
                 <a:solidFill>
                   <a:srgbClr val="7030A0"/>
                 </a:solidFill>
@@ -5745,7 +5723,7 @@
           <a:p>
             <a:pPr algn="ctr"/>
             <a:r>
-              <a:rPr lang="en-US" sz="1100" dirty="0" smtClean="0">
+              <a:rPr lang="en-US" sz="1100" dirty="0">
                 <a:solidFill>
                   <a:srgbClr val="7030A0"/>
                 </a:solidFill>
@@ -5784,7 +5762,7 @@
           <a:p>
             <a:pPr algn="ctr"/>
             <a:r>
-              <a:rPr lang="en-US" sz="1100" dirty="0" smtClean="0">
+              <a:rPr lang="en-US" sz="1100" dirty="0">
                 <a:solidFill>
                   <a:srgbClr val="7030A0"/>
                 </a:solidFill>
@@ -5823,7 +5801,7 @@
           <a:p>
             <a:pPr algn="ctr"/>
             <a:r>
-              <a:rPr lang="en-US" sz="1100" dirty="0" smtClean="0">
+              <a:rPr lang="en-US" sz="1100" dirty="0">
                 <a:solidFill>
                   <a:srgbClr val="7030A0"/>
                 </a:solidFill>
@@ -5862,7 +5840,7 @@
           <a:p>
             <a:pPr algn="ctr"/>
             <a:r>
-              <a:rPr lang="en-US" sz="1100" dirty="0" smtClean="0">
+              <a:rPr lang="en-US" sz="1100" dirty="0">
                 <a:solidFill>
                   <a:srgbClr val="7030A0"/>
                 </a:solidFill>
@@ -5901,7 +5879,7 @@
           <a:p>
             <a:pPr algn="ctr"/>
             <a:r>
-              <a:rPr lang="en-US" sz="1100" dirty="0" smtClean="0">
+              <a:rPr lang="en-US" sz="1100" dirty="0">
                 <a:solidFill>
                   <a:srgbClr val="7030A0"/>
                 </a:solidFill>
@@ -5916,6 +5894,219 @@
           </a:p>
         </p:txBody>
       </p:sp>
+      <p:sp>
+        <p:nvSpPr>
+          <p:cNvPr id="55" name="Rectangle 8">
+            <a:extLst>
+              <a:ext uri="{FF2B5EF4-FFF2-40B4-BE49-F238E27FC236}">
+                <a16:creationId xmlns:a16="http://schemas.microsoft.com/office/drawing/2014/main" id="{A552645E-05DD-4025-8783-3E0B4013A54F}"/>
+              </a:ext>
+            </a:extLst>
+          </p:cNvPr>
+          <p:cNvSpPr/>
+          <p:nvPr/>
+        </p:nvSpPr>
+        <p:spPr>
+          <a:xfrm>
+            <a:off x="7711200" y="3859200"/>
+            <a:ext cx="747000" cy="285783"/>
+          </a:xfrm>
+          <a:prstGeom prst="rect">
+            <a:avLst/>
+          </a:prstGeom>
+          <a:ln w="19050">
+            <a:solidFill>
+              <a:srgbClr val="7030A0"/>
+            </a:solidFill>
+          </a:ln>
+          <a:effectLst/>
+        </p:spPr>
+        <p:style>
+          <a:lnRef idx="1">
+            <a:schemeClr val="accent4"/>
+          </a:lnRef>
+          <a:fillRef idx="2">
+            <a:schemeClr val="accent4"/>
+          </a:fillRef>
+          <a:effectRef idx="1">
+            <a:schemeClr val="accent4"/>
+          </a:effectRef>
+          <a:fontRef idx="minor">
+            <a:schemeClr val="dk1"/>
+          </a:fontRef>
+        </p:style>
+        <p:txBody>
+          <a:bodyPr rtlCol="0" anchor="ctr"/>
+          <a:lstStyle/>
+          <a:p>
+            <a:pPr algn="ctr"/>
+            <a:r>
+              <a:rPr lang="en-US" sz="1050" dirty="0">
+                <a:solidFill>
+                  <a:srgbClr val="7030A0"/>
+                </a:solidFill>
+              </a:rPr>
+              <a:t>Birthday</a:t>
+            </a:r>
+            <a:endParaRPr lang="en-SG" sz="1050" dirty="0">
+              <a:solidFill>
+                <a:srgbClr val="7030A0"/>
+              </a:solidFill>
+            </a:endParaRPr>
+          </a:p>
+        </p:txBody>
+      </p:sp>
+      <p:sp>
+        <p:nvSpPr>
+          <p:cNvPr id="73" name="Rectangle 8">
+            <a:extLst>
+              <a:ext uri="{FF2B5EF4-FFF2-40B4-BE49-F238E27FC236}">
+                <a16:creationId xmlns:a16="http://schemas.microsoft.com/office/drawing/2014/main" id="{8BE37FFA-90F7-4963-93D6-CBFD83A061D0}"/>
+              </a:ext>
+            </a:extLst>
+          </p:cNvPr>
+          <p:cNvSpPr/>
+          <p:nvPr/>
+        </p:nvSpPr>
+        <p:spPr>
+          <a:xfrm>
+            <a:off x="7711200" y="4183200"/>
+            <a:ext cx="747000" cy="285783"/>
+          </a:xfrm>
+          <a:prstGeom prst="rect">
+            <a:avLst/>
+          </a:prstGeom>
+          <a:ln w="19050">
+            <a:solidFill>
+              <a:srgbClr val="7030A0"/>
+            </a:solidFill>
+          </a:ln>
+          <a:effectLst/>
+        </p:spPr>
+        <p:style>
+          <a:lnRef idx="1">
+            <a:schemeClr val="accent4"/>
+          </a:lnRef>
+          <a:fillRef idx="2">
+            <a:schemeClr val="accent4"/>
+          </a:fillRef>
+          <a:effectRef idx="1">
+            <a:schemeClr val="accent4"/>
+          </a:effectRef>
+          <a:fontRef idx="minor">
+            <a:schemeClr val="dk1"/>
+          </a:fontRef>
+        </p:style>
+        <p:txBody>
+          <a:bodyPr rtlCol="0" anchor="ctr"/>
+          <a:lstStyle/>
+          <a:p>
+            <a:pPr algn="ctr"/>
+            <a:r>
+              <a:rPr lang="en-US" sz="1050" dirty="0">
+                <a:solidFill>
+                  <a:srgbClr val="7030A0"/>
+                </a:solidFill>
+              </a:rPr>
+              <a:t>Nickname</a:t>
+            </a:r>
+          </a:p>
+        </p:txBody>
+      </p:sp>
+      <p:cxnSp>
+        <p:nvCxnSpPr>
+          <p:cNvPr id="87" name="Elbow Connector 49">
+            <a:extLst>
+              <a:ext uri="{FF2B5EF4-FFF2-40B4-BE49-F238E27FC236}">
+                <a16:creationId xmlns:a16="http://schemas.microsoft.com/office/drawing/2014/main" id="{9319264E-54F8-42DB-83F4-979CE961254C}"/>
+              </a:ext>
+            </a:extLst>
+          </p:cNvPr>
+          <p:cNvCxnSpPr>
+            <a:cxnSpLocks/>
+            <a:endCxn id="55" idx="1"/>
+          </p:cNvCxnSpPr>
+          <p:nvPr/>
+        </p:nvCxnSpPr>
+        <p:spPr>
+          <a:xfrm rot="16200000" flipH="1">
+            <a:off x="7122404" y="3413296"/>
+            <a:ext cx="954092" cy="223499"/>
+          </a:xfrm>
+          <a:prstGeom prst="bentConnector2">
+            <a:avLst/>
+          </a:prstGeom>
+          <a:ln w="19050">
+            <a:solidFill>
+              <a:srgbClr val="7030A0"/>
+            </a:solidFill>
+            <a:headEnd type="none" w="med" len="med"/>
+            <a:tailEnd type="arrow" w="med" len="med"/>
+          </a:ln>
+          <a:effectLst/>
+        </p:spPr>
+        <p:style>
+          <a:lnRef idx="1">
+            <a:schemeClr val="accent2"/>
+          </a:lnRef>
+          <a:fillRef idx="2">
+            <a:schemeClr val="accent2"/>
+          </a:fillRef>
+          <a:effectRef idx="1">
+            <a:schemeClr val="accent2"/>
+          </a:effectRef>
+          <a:fontRef idx="minor">
+            <a:schemeClr val="dk1"/>
+          </a:fontRef>
+        </p:style>
+      </p:cxnSp>
+      <p:cxnSp>
+        <p:nvCxnSpPr>
+          <p:cNvPr id="88" name="Elbow Connector 49">
+            <a:extLst>
+              <a:ext uri="{FF2B5EF4-FFF2-40B4-BE49-F238E27FC236}">
+                <a16:creationId xmlns:a16="http://schemas.microsoft.com/office/drawing/2014/main" id="{3FDD8E82-3CDF-4873-B838-6520DEECAF19}"/>
+              </a:ext>
+            </a:extLst>
+          </p:cNvPr>
+          <p:cNvCxnSpPr>
+            <a:cxnSpLocks/>
+            <a:endCxn id="73" idx="1"/>
+          </p:cNvCxnSpPr>
+          <p:nvPr/>
+        </p:nvCxnSpPr>
+        <p:spPr>
+          <a:xfrm rot="16200000" flipH="1">
+            <a:off x="7037602" y="3652494"/>
+            <a:ext cx="1125692" cy="221504"/>
+          </a:xfrm>
+          <a:prstGeom prst="bentConnector2">
+            <a:avLst/>
+          </a:prstGeom>
+          <a:ln w="19050">
+            <a:solidFill>
+              <a:srgbClr val="7030A0"/>
+            </a:solidFill>
+            <a:headEnd type="none" w="med" len="med"/>
+            <a:tailEnd type="arrow" w="med" len="med"/>
+          </a:ln>
+          <a:effectLst/>
+        </p:spPr>
+        <p:style>
+          <a:lnRef idx="1">
+            <a:schemeClr val="accent2"/>
+          </a:lnRef>
+          <a:fillRef idx="2">
+            <a:schemeClr val="accent2"/>
+          </a:fillRef>
+          <a:effectRef idx="1">
+            <a:schemeClr val="accent2"/>
+          </a:effectRef>
+          <a:fontRef idx="minor">
+            <a:schemeClr val="dk1"/>
+          </a:fontRef>
+        </p:style>
+      </p:cxnSp>
     </p:spTree>
     <p:extLst>
       <p:ext uri="{BB962C8B-B14F-4D97-AF65-F5344CB8AC3E}">
@@ -5926,13 +6117,6 @@
   <p:clrMapOvr>
     <a:masterClrMapping/>
   </p:clrMapOvr>
-  <p:timing>
-    <p:tnLst>
-      <p:par>
-        <p:cTn id="1" dur="indefinite" restart="never" nodeType="tmRoot"/>
-      </p:par>
-    </p:tnLst>
-  </p:timing>
 </p:sld>
 </file>
 

</xml_diff>

<commit_message>
Changed the relevant components' diagram. Yet to update the explanation and photo for Reminder implementation.
</commit_message>
<xml_diff>
--- a/docs/diagrams/ModelComponentClassDiagram.pptx
+++ b/docs/diagrams/ModelComponentClassDiagram.pptx
@@ -109,7 +109,7 @@
   </p:defaultTextStyle>
   <p:extLst>
     <p:ext uri="{EFAFB233-063F-42B5-8137-9DF3F51BA10A}">
-      <p15:sldGuideLst xmlns:p15="http://schemas.microsoft.com/office/powerpoint/2012/main">
+      <p15:sldGuideLst xmlns:p15="http://schemas.microsoft.com/office/powerpoint/2012/main" xmlns="">
         <p15:guide id="1" orient="horz" pos="1488">
           <p15:clr>
             <a:srgbClr val="A4A3A4"/>
@@ -212,7 +212,7 @@
           <a:p>
             <a:fld id="{F5CC4B3F-88C1-4FFA-B1B6-F41C21DC6924}" type="datetimeFigureOut">
               <a:rPr lang="en-US" smtClean="0"/>
-              <a:t>10/18/2017</a:t>
+              <a:t>10/25/17</a:t>
             </a:fld>
             <a:endParaRPr lang="en-US"/>
           </a:p>
@@ -658,7 +658,7 @@
           <a:p>
             <a:fld id="{78C97017-6FC3-485B-9764-EAC9E56C1D49}" type="datetimeFigureOut">
               <a:rPr lang="en-US" smtClean="0"/>
-              <a:t>10/18/2017</a:t>
+              <a:t>10/25/17</a:t>
             </a:fld>
             <a:endParaRPr lang="en-US"/>
           </a:p>
@@ -826,7 +826,7 @@
           <a:p>
             <a:fld id="{78C97017-6FC3-485B-9764-EAC9E56C1D49}" type="datetimeFigureOut">
               <a:rPr lang="en-US" smtClean="0"/>
-              <a:t>10/18/2017</a:t>
+              <a:t>10/25/17</a:t>
             </a:fld>
             <a:endParaRPr lang="en-US"/>
           </a:p>
@@ -1004,7 +1004,7 @@
           <a:p>
             <a:fld id="{78C97017-6FC3-485B-9764-EAC9E56C1D49}" type="datetimeFigureOut">
               <a:rPr lang="en-US" smtClean="0"/>
-              <a:t>10/18/2017</a:t>
+              <a:t>10/25/17</a:t>
             </a:fld>
             <a:endParaRPr lang="en-US"/>
           </a:p>
@@ -1172,7 +1172,7 @@
           <a:p>
             <a:fld id="{78C97017-6FC3-485B-9764-EAC9E56C1D49}" type="datetimeFigureOut">
               <a:rPr lang="en-US" smtClean="0"/>
-              <a:t>10/18/2017</a:t>
+              <a:t>10/25/17</a:t>
             </a:fld>
             <a:endParaRPr lang="en-US"/>
           </a:p>
@@ -1417,7 +1417,7 @@
           <a:p>
             <a:fld id="{78C97017-6FC3-485B-9764-EAC9E56C1D49}" type="datetimeFigureOut">
               <a:rPr lang="en-US" smtClean="0"/>
-              <a:t>10/18/2017</a:t>
+              <a:t>10/25/17</a:t>
             </a:fld>
             <a:endParaRPr lang="en-US"/>
           </a:p>
@@ -1702,7 +1702,7 @@
           <a:p>
             <a:fld id="{78C97017-6FC3-485B-9764-EAC9E56C1D49}" type="datetimeFigureOut">
               <a:rPr lang="en-US" smtClean="0"/>
-              <a:t>10/18/2017</a:t>
+              <a:t>10/25/17</a:t>
             </a:fld>
             <a:endParaRPr lang="en-US"/>
           </a:p>
@@ -2121,7 +2121,7 @@
           <a:p>
             <a:fld id="{78C97017-6FC3-485B-9764-EAC9E56C1D49}" type="datetimeFigureOut">
               <a:rPr lang="en-US" smtClean="0"/>
-              <a:t>10/18/2017</a:t>
+              <a:t>10/25/17</a:t>
             </a:fld>
             <a:endParaRPr lang="en-US"/>
           </a:p>
@@ -2238,7 +2238,7 @@
           <a:p>
             <a:fld id="{78C97017-6FC3-485B-9764-EAC9E56C1D49}" type="datetimeFigureOut">
               <a:rPr lang="en-US" smtClean="0"/>
-              <a:t>10/18/2017</a:t>
+              <a:t>10/25/17</a:t>
             </a:fld>
             <a:endParaRPr lang="en-US"/>
           </a:p>
@@ -2333,7 +2333,7 @@
           <a:p>
             <a:fld id="{78C97017-6FC3-485B-9764-EAC9E56C1D49}" type="datetimeFigureOut">
               <a:rPr lang="en-US" smtClean="0"/>
-              <a:t>10/18/2017</a:t>
+              <a:t>10/25/17</a:t>
             </a:fld>
             <a:endParaRPr lang="en-US"/>
           </a:p>
@@ -2608,7 +2608,7 @@
           <a:p>
             <a:fld id="{78C97017-6FC3-485B-9764-EAC9E56C1D49}" type="datetimeFigureOut">
               <a:rPr lang="en-US" smtClean="0"/>
-              <a:t>10/18/2017</a:t>
+              <a:t>10/25/17</a:t>
             </a:fld>
             <a:endParaRPr lang="en-US"/>
           </a:p>
@@ -2860,7 +2860,7 @@
           <a:p>
             <a:fld id="{78C97017-6FC3-485B-9764-EAC9E56C1D49}" type="datetimeFigureOut">
               <a:rPr lang="en-US" smtClean="0"/>
-              <a:t>10/18/2017</a:t>
+              <a:t>10/25/17</a:t>
             </a:fld>
             <a:endParaRPr lang="en-US"/>
           </a:p>
@@ -3071,7 +3071,7 @@
           <a:p>
             <a:fld id="{78C97017-6FC3-485B-9764-EAC9E56C1D49}" type="datetimeFigureOut">
               <a:rPr lang="en-US" smtClean="0"/>
-              <a:t>10/18/2017</a:t>
+              <a:t>10/25/17</a:t>
             </a:fld>
             <a:endParaRPr lang="en-US"/>
           </a:p>
@@ -3455,7 +3455,7 @@
         <p:spPr>
           <a:xfrm>
             <a:off x="1119865" y="1727200"/>
-            <a:ext cx="7490735" cy="2997200"/>
+            <a:ext cx="7490735" cy="3759200"/>
           </a:xfrm>
           <a:prstGeom prst="roundRect">
             <a:avLst>
@@ -3574,8 +3574,8 @@
         </p:nvSpPr>
         <p:spPr>
           <a:xfrm rot="16200000">
-            <a:off x="1683963" y="2868687"/>
-            <a:ext cx="1093635" cy="346760"/>
+            <a:off x="1344806" y="3207844"/>
+            <a:ext cx="1771950" cy="346760"/>
           </a:xfrm>
           <a:prstGeom prst="rect">
             <a:avLst/>
@@ -3648,50 +3648,6 @@
             <a:prstDash val="sysDot"/>
             <a:headEnd type="none" w="med" len="med"/>
             <a:tailEnd type="none" w="med" len="med"/>
-          </a:ln>
-          <a:effectLst/>
-        </p:spPr>
-        <p:style>
-          <a:lnRef idx="1">
-            <a:schemeClr val="accent2"/>
-          </a:lnRef>
-          <a:fillRef idx="2">
-            <a:schemeClr val="accent2"/>
-          </a:fillRef>
-          <a:effectRef idx="1">
-            <a:schemeClr val="accent2"/>
-          </a:effectRef>
-          <a:fontRef idx="minor">
-            <a:schemeClr val="dk1"/>
-          </a:fontRef>
-        </p:style>
-      </p:cxnSp>
-      <p:cxnSp>
-        <p:nvCxnSpPr>
-          <p:cNvPr id="107" name="Elbow Connector 106"/>
-          <p:cNvCxnSpPr>
-            <a:stCxn id="9" idx="1"/>
-          </p:cNvCxnSpPr>
-          <p:nvPr/>
-        </p:nvCxnSpPr>
-        <p:spPr>
-          <a:xfrm rot="5400000" flipH="1" flipV="1">
-            <a:off x="4360065" y="1080909"/>
-            <a:ext cx="378691" cy="4637261"/>
-          </a:xfrm>
-          <a:prstGeom prst="bentConnector4">
-            <a:avLst>
-              <a:gd name="adj1" fmla="val -101829"/>
-              <a:gd name="adj2" fmla="val 99976"/>
-            </a:avLst>
-          </a:prstGeom>
-          <a:ln w="19050">
-            <a:solidFill>
-              <a:srgbClr val="7030A0"/>
-            </a:solidFill>
-            <a:prstDash val="solid"/>
-            <a:headEnd type="none" w="med" len="med"/>
-            <a:tailEnd type="arrow" w="med" len="med"/>
           </a:ln>
           <a:effectLst/>
         </p:spPr>
@@ -5436,7 +5392,7 @@
         </p:nvSpPr>
         <p:spPr>
           <a:xfrm>
-            <a:off x="2057401" y="4239491"/>
+            <a:off x="2057400" y="4876800"/>
             <a:ext cx="1066800" cy="346760"/>
           </a:xfrm>
           <a:prstGeom prst="rect">
@@ -5476,6 +5432,14 @@
               </a:rPr>
               <a:t>&lt;&lt;interface&gt;&gt;</a:t>
             </a:r>
+            <a:r>
+              <a:rPr lang="en-US" sz="1050">
+                <a:solidFill>
+                  <a:srgbClr val="7030A0"/>
+                </a:solidFill>
+              </a:rPr>
+              <a:t/>
+            </a:r>
             <a:br>
               <a:rPr lang="en-US" sz="1050">
                 <a:solidFill>
@@ -5510,8 +5474,8 @@
         </p:nvCxnSpPr>
         <p:spPr>
           <a:xfrm rot="16200000" flipH="1">
-            <a:off x="1364475" y="3719944"/>
-            <a:ext cx="831471" cy="554381"/>
+            <a:off x="1045820" y="4038600"/>
+            <a:ext cx="1468780" cy="554380"/>
           </a:xfrm>
           <a:prstGeom prst="bentConnector2">
             <a:avLst/>
@@ -5899,7 +5863,7 @@
           <p:cNvPr id="55" name="Rectangle 8">
             <a:extLst>
               <a:ext uri="{FF2B5EF4-FFF2-40B4-BE49-F238E27FC236}">
-                <a16:creationId xmlns:a16="http://schemas.microsoft.com/office/drawing/2014/main" id="{A552645E-05DD-4025-8783-3E0B4013A54F}"/>
+                <a16:creationId xmlns:a16="http://schemas.microsoft.com/office/drawing/2014/main" xmlns="" id="{A552645E-05DD-4025-8783-3E0B4013A54F}"/>
               </a:ext>
             </a:extLst>
           </p:cNvPr>
@@ -5961,7 +5925,7 @@
           <p:cNvPr id="73" name="Rectangle 8">
             <a:extLst>
               <a:ext uri="{FF2B5EF4-FFF2-40B4-BE49-F238E27FC236}">
-                <a16:creationId xmlns:a16="http://schemas.microsoft.com/office/drawing/2014/main" id="{8BE37FFA-90F7-4963-93D6-CBFD83A061D0}"/>
+                <a16:creationId xmlns:a16="http://schemas.microsoft.com/office/drawing/2014/main" xmlns="" id="{8BE37FFA-90F7-4963-93D6-CBFD83A061D0}"/>
               </a:ext>
             </a:extLst>
           </p:cNvPr>
@@ -6018,7 +5982,7 @@
           <p:cNvPr id="87" name="Elbow Connector 49">
             <a:extLst>
               <a:ext uri="{FF2B5EF4-FFF2-40B4-BE49-F238E27FC236}">
-                <a16:creationId xmlns:a16="http://schemas.microsoft.com/office/drawing/2014/main" id="{9319264E-54F8-42DB-83F4-979CE961254C}"/>
+                <a16:creationId xmlns:a16="http://schemas.microsoft.com/office/drawing/2014/main" xmlns="" id="{9319264E-54F8-42DB-83F4-979CE961254C}"/>
               </a:ext>
             </a:extLst>
           </p:cNvPr>
@@ -6065,7 +6029,7 @@
           <p:cNvPr id="88" name="Elbow Connector 49">
             <a:extLst>
               <a:ext uri="{FF2B5EF4-FFF2-40B4-BE49-F238E27FC236}">
-                <a16:creationId xmlns:a16="http://schemas.microsoft.com/office/drawing/2014/main" id="{3FDD8E82-3CDF-4873-B838-6520DEECAF19}"/>
+                <a16:creationId xmlns:a16="http://schemas.microsoft.com/office/drawing/2014/main" xmlns="" id="{3FDD8E82-3CDF-4873-B838-6520DEECAF19}"/>
               </a:ext>
             </a:extLst>
           </p:cNvPr>
@@ -6107,6 +6071,684 @@
           </a:fontRef>
         </p:style>
       </p:cxnSp>
+      <p:cxnSp>
+        <p:nvCxnSpPr>
+          <p:cNvPr id="13" name="Straight Connector 12"/>
+          <p:cNvCxnSpPr/>
+          <p:nvPr/>
+        </p:nvCxnSpPr>
+        <p:spPr>
+          <a:xfrm>
+            <a:off x="2209800" y="4267200"/>
+            <a:ext cx="0" cy="304800"/>
+          </a:xfrm>
+          <a:prstGeom prst="line">
+            <a:avLst/>
+          </a:prstGeom>
+          <a:ln>
+            <a:solidFill>
+              <a:srgbClr val="52069D"/>
+            </a:solidFill>
+          </a:ln>
+          <a:effectLst>
+            <a:outerShdw blurRad="40000" dist="20000" dir="5400000" rotWithShape="0">
+              <a:schemeClr val="bg1">
+                <a:alpha val="38000"/>
+              </a:schemeClr>
+            </a:outerShdw>
+          </a:effectLst>
+        </p:spPr>
+        <p:style>
+          <a:lnRef idx="2">
+            <a:schemeClr val="accent1"/>
+          </a:lnRef>
+          <a:fillRef idx="0">
+            <a:schemeClr val="accent1"/>
+          </a:fillRef>
+          <a:effectRef idx="1">
+            <a:schemeClr val="accent1"/>
+          </a:effectRef>
+          <a:fontRef idx="minor">
+            <a:schemeClr val="tx1"/>
+          </a:fontRef>
+        </p:style>
+      </p:cxnSp>
+      <p:cxnSp>
+        <p:nvCxnSpPr>
+          <p:cNvPr id="15" name="Straight Connector 14"/>
+          <p:cNvCxnSpPr/>
+          <p:nvPr/>
+        </p:nvCxnSpPr>
+        <p:spPr>
+          <a:xfrm>
+            <a:off x="2209800" y="4572000"/>
+            <a:ext cx="4648200" cy="0"/>
+          </a:xfrm>
+          <a:prstGeom prst="line">
+            <a:avLst/>
+          </a:prstGeom>
+          <a:ln>
+            <a:solidFill>
+              <a:srgbClr val="52069D"/>
+            </a:solidFill>
+          </a:ln>
+          <a:effectLst>
+            <a:outerShdw blurRad="40000" dist="20000" dir="5400000" rotWithShape="0">
+              <a:schemeClr val="bg1">
+                <a:alpha val="38000"/>
+              </a:schemeClr>
+            </a:outerShdw>
+          </a:effectLst>
+        </p:spPr>
+        <p:style>
+          <a:lnRef idx="2">
+            <a:schemeClr val="accent1"/>
+          </a:lnRef>
+          <a:fillRef idx="0">
+            <a:schemeClr val="accent1"/>
+          </a:fillRef>
+          <a:effectRef idx="1">
+            <a:schemeClr val="accent1"/>
+          </a:effectRef>
+          <a:fontRef idx="minor">
+            <a:schemeClr val="tx1"/>
+          </a:fontRef>
+        </p:style>
+      </p:cxnSp>
+      <p:cxnSp>
+        <p:nvCxnSpPr>
+          <p:cNvPr id="17" name="Straight Arrow Connector 16"/>
+          <p:cNvCxnSpPr/>
+          <p:nvPr/>
+        </p:nvCxnSpPr>
+        <p:spPr>
+          <a:xfrm flipV="1">
+            <a:off x="6858000" y="3200400"/>
+            <a:ext cx="0" cy="1371600"/>
+          </a:xfrm>
+          <a:prstGeom prst="straightConnector1">
+            <a:avLst/>
+          </a:prstGeom>
+          <a:ln>
+            <a:solidFill>
+              <a:srgbClr val="52069D"/>
+            </a:solidFill>
+            <a:tailEnd type="arrow"/>
+          </a:ln>
+          <a:effectLst>
+            <a:outerShdw blurRad="40000" dist="20000" dir="5400000" rotWithShape="0">
+              <a:schemeClr val="bg1">
+                <a:alpha val="38000"/>
+              </a:schemeClr>
+            </a:outerShdw>
+          </a:effectLst>
+        </p:spPr>
+        <p:style>
+          <a:lnRef idx="2">
+            <a:schemeClr val="accent1"/>
+          </a:lnRef>
+          <a:fillRef idx="0">
+            <a:schemeClr val="accent1"/>
+          </a:fillRef>
+          <a:effectRef idx="1">
+            <a:schemeClr val="accent1"/>
+          </a:effectRef>
+          <a:fontRef idx="minor">
+            <a:schemeClr val="tx1"/>
+          </a:fontRef>
+        </p:style>
+      </p:cxnSp>
+      <p:cxnSp>
+        <p:nvCxnSpPr>
+          <p:cNvPr id="74" name="Straight Arrow Connector 73"/>
+          <p:cNvCxnSpPr>
+            <a:stCxn id="77" idx="3"/>
+          </p:cNvCxnSpPr>
+          <p:nvPr/>
+        </p:nvCxnSpPr>
+        <p:spPr>
+          <a:xfrm>
+            <a:off x="2674448" y="3972890"/>
+            <a:ext cx="220810" cy="5284"/>
+          </a:xfrm>
+          <a:prstGeom prst="straightConnector1">
+            <a:avLst/>
+          </a:prstGeom>
+          <a:ln w="19050">
+            <a:solidFill>
+              <a:srgbClr val="7030A0"/>
+            </a:solidFill>
+            <a:headEnd type="none" w="med" len="med"/>
+            <a:tailEnd type="arrow" w="med" len="med"/>
+          </a:ln>
+          <a:effectLst/>
+        </p:spPr>
+        <p:style>
+          <a:lnRef idx="1">
+            <a:schemeClr val="accent2"/>
+          </a:lnRef>
+          <a:fillRef idx="2">
+            <a:schemeClr val="accent2"/>
+          </a:fillRef>
+          <a:effectRef idx="1">
+            <a:schemeClr val="accent2"/>
+          </a:effectRef>
+          <a:fontRef idx="minor">
+            <a:schemeClr val="dk1"/>
+          </a:fontRef>
+        </p:style>
+      </p:cxnSp>
+      <p:sp>
+        <p:nvSpPr>
+          <p:cNvPr id="77" name="Flowchart: Decision 96"/>
+          <p:cNvSpPr/>
+          <p:nvPr/>
+        </p:nvSpPr>
+        <p:spPr>
+          <a:xfrm>
+            <a:off x="2438400" y="3886200"/>
+            <a:ext cx="236048" cy="173380"/>
+          </a:xfrm>
+          <a:prstGeom prst="flowChartDecision">
+            <a:avLst/>
+          </a:prstGeom>
+          <a:noFill/>
+          <a:ln w="19050">
+            <a:solidFill>
+              <a:srgbClr val="7030A0"/>
+            </a:solidFill>
+          </a:ln>
+          <a:effectLst/>
+        </p:spPr>
+        <p:style>
+          <a:lnRef idx="1">
+            <a:schemeClr val="accent6"/>
+          </a:lnRef>
+          <a:fillRef idx="2">
+            <a:schemeClr val="accent6"/>
+          </a:fillRef>
+          <a:effectRef idx="1">
+            <a:schemeClr val="accent6"/>
+          </a:effectRef>
+          <a:fontRef idx="minor">
+            <a:schemeClr val="dk1"/>
+          </a:fontRef>
+        </p:style>
+        <p:txBody>
+          <a:bodyPr rtlCol="0" anchor="ctr"/>
+          <a:lstStyle/>
+          <a:p>
+            <a:pPr algn="ctr"/>
+            <a:endParaRPr lang="en-US" sz="1050"/>
+          </a:p>
+        </p:txBody>
+      </p:sp>
+      <p:sp>
+        <p:nvSpPr>
+          <p:cNvPr id="82" name="TextBox 81"/>
+          <p:cNvSpPr txBox="1"/>
+          <p:nvPr/>
+        </p:nvSpPr>
+        <p:spPr>
+          <a:xfrm>
+            <a:off x="2667000" y="3733800"/>
+            <a:ext cx="189257" cy="178683"/>
+          </a:xfrm>
+          <a:prstGeom prst="rect">
+            <a:avLst/>
+          </a:prstGeom>
+          <a:noFill/>
+        </p:spPr>
+        <p:txBody>
+          <a:bodyPr wrap="square" lIns="0" tIns="0" rIns="0" bIns="0" rtlCol="0">
+            <a:noAutofit/>
+          </a:bodyPr>
+          <a:lstStyle/>
+          <a:p>
+            <a:pPr algn="ctr"/>
+            <a:r>
+              <a:rPr lang="en-US" sz="1100" dirty="0">
+                <a:solidFill>
+                  <a:srgbClr val="7030A0"/>
+                </a:solidFill>
+              </a:rPr>
+              <a:t>1</a:t>
+            </a:r>
+            <a:endParaRPr lang="en-SG" sz="1100" dirty="0">
+              <a:solidFill>
+                <a:srgbClr val="7030A0"/>
+              </a:solidFill>
+            </a:endParaRPr>
+          </a:p>
+        </p:txBody>
+      </p:sp>
+      <p:sp>
+        <p:nvSpPr>
+          <p:cNvPr id="89" name="Rectangle 8"/>
+          <p:cNvSpPr/>
+          <p:nvPr/>
+        </p:nvSpPr>
+        <p:spPr>
+          <a:xfrm>
+            <a:off x="2895600" y="3810000"/>
+            <a:ext cx="1295400" cy="346760"/>
+          </a:xfrm>
+          <a:prstGeom prst="rect">
+            <a:avLst/>
+          </a:prstGeom>
+          <a:ln w="19050">
+            <a:solidFill>
+              <a:srgbClr val="7030A0"/>
+            </a:solidFill>
+          </a:ln>
+          <a:effectLst/>
+        </p:spPr>
+        <p:style>
+          <a:lnRef idx="1">
+            <a:schemeClr val="accent4"/>
+          </a:lnRef>
+          <a:fillRef idx="2">
+            <a:schemeClr val="accent4"/>
+          </a:fillRef>
+          <a:effectRef idx="1">
+            <a:schemeClr val="accent4"/>
+          </a:effectRef>
+          <a:fontRef idx="minor">
+            <a:schemeClr val="dk1"/>
+          </a:fontRef>
+        </p:style>
+        <p:txBody>
+          <a:bodyPr rtlCol="0" anchor="ctr"/>
+          <a:lstStyle/>
+          <a:p>
+            <a:pPr algn="ctr"/>
+            <a:r>
+              <a:rPr lang="en-US" sz="1050" dirty="0" err="1">
+                <a:solidFill>
+                  <a:srgbClr val="7030A0"/>
+                </a:solidFill>
+              </a:rPr>
+              <a:t>UniqueReminderList</a:t>
+            </a:r>
+            <a:endParaRPr lang="en-SG" sz="1050" dirty="0">
+              <a:solidFill>
+                <a:srgbClr val="7030A0"/>
+              </a:solidFill>
+            </a:endParaRPr>
+          </a:p>
+        </p:txBody>
+      </p:sp>
+      <p:sp>
+        <p:nvSpPr>
+          <p:cNvPr id="92" name="Flowchart: Decision 96"/>
+          <p:cNvSpPr/>
+          <p:nvPr/>
+        </p:nvSpPr>
+        <p:spPr>
+          <a:xfrm>
+            <a:off x="3886200" y="4160520"/>
+            <a:ext cx="182880" cy="249580"/>
+          </a:xfrm>
+          <a:prstGeom prst="flowChartDecision">
+            <a:avLst/>
+          </a:prstGeom>
+          <a:noFill/>
+          <a:ln w="19050">
+            <a:solidFill>
+              <a:srgbClr val="7030A0"/>
+            </a:solidFill>
+          </a:ln>
+          <a:effectLst/>
+        </p:spPr>
+        <p:style>
+          <a:lnRef idx="1">
+            <a:schemeClr val="accent6"/>
+          </a:lnRef>
+          <a:fillRef idx="2">
+            <a:schemeClr val="accent6"/>
+          </a:fillRef>
+          <a:effectRef idx="1">
+            <a:schemeClr val="accent6"/>
+          </a:effectRef>
+          <a:fontRef idx="minor">
+            <a:schemeClr val="dk1"/>
+          </a:fontRef>
+        </p:style>
+        <p:txBody>
+          <a:bodyPr rtlCol="0" anchor="ctr"/>
+          <a:lstStyle/>
+          <a:p>
+            <a:pPr algn="ctr"/>
+            <a:endParaRPr lang="en-US" sz="1050"/>
+          </a:p>
+        </p:txBody>
+      </p:sp>
+      <p:cxnSp>
+        <p:nvCxnSpPr>
+          <p:cNvPr id="20" name="Straight Connector 19"/>
+          <p:cNvCxnSpPr/>
+          <p:nvPr/>
+        </p:nvCxnSpPr>
+        <p:spPr>
+          <a:xfrm>
+            <a:off x="3977640" y="4419600"/>
+            <a:ext cx="0" cy="609600"/>
+          </a:xfrm>
+          <a:prstGeom prst="line">
+            <a:avLst/>
+          </a:prstGeom>
+          <a:ln>
+            <a:solidFill>
+              <a:srgbClr val="52069D"/>
+            </a:solidFill>
+          </a:ln>
+          <a:effectLst>
+            <a:outerShdw blurRad="40000" dist="20000" dir="5400000" rotWithShape="0">
+              <a:schemeClr val="bg1">
+                <a:alpha val="38000"/>
+              </a:schemeClr>
+            </a:outerShdw>
+          </a:effectLst>
+        </p:spPr>
+        <p:style>
+          <a:lnRef idx="2">
+            <a:schemeClr val="accent1"/>
+          </a:lnRef>
+          <a:fillRef idx="0">
+            <a:schemeClr val="accent1"/>
+          </a:fillRef>
+          <a:effectRef idx="1">
+            <a:schemeClr val="accent1"/>
+          </a:effectRef>
+          <a:fontRef idx="minor">
+            <a:schemeClr val="tx1"/>
+          </a:fontRef>
+        </p:style>
+      </p:cxnSp>
+      <p:cxnSp>
+        <p:nvCxnSpPr>
+          <p:cNvPr id="23" name="Straight Arrow Connector 22"/>
+          <p:cNvCxnSpPr/>
+          <p:nvPr/>
+        </p:nvCxnSpPr>
+        <p:spPr>
+          <a:xfrm>
+            <a:off x="3962400" y="5029200"/>
+            <a:ext cx="914400" cy="0"/>
+          </a:xfrm>
+          <a:prstGeom prst="straightConnector1">
+            <a:avLst/>
+          </a:prstGeom>
+          <a:ln>
+            <a:solidFill>
+              <a:srgbClr val="52069D"/>
+            </a:solidFill>
+            <a:tailEnd type="arrow"/>
+          </a:ln>
+          <a:effectLst>
+            <a:outerShdw blurRad="40000" dist="20000" dir="5400000" rotWithShape="0">
+              <a:schemeClr val="bg1">
+                <a:alpha val="38000"/>
+              </a:schemeClr>
+            </a:outerShdw>
+          </a:effectLst>
+        </p:spPr>
+        <p:style>
+          <a:lnRef idx="2">
+            <a:schemeClr val="accent1"/>
+          </a:lnRef>
+          <a:fillRef idx="0">
+            <a:schemeClr val="accent1"/>
+          </a:fillRef>
+          <a:effectRef idx="1">
+            <a:schemeClr val="accent1"/>
+          </a:effectRef>
+          <a:fontRef idx="minor">
+            <a:schemeClr val="tx1"/>
+          </a:fontRef>
+        </p:style>
+      </p:cxnSp>
+      <p:sp>
+        <p:nvSpPr>
+          <p:cNvPr id="93" name="Rectangle 8"/>
+          <p:cNvSpPr/>
+          <p:nvPr/>
+        </p:nvSpPr>
+        <p:spPr>
+          <a:xfrm>
+            <a:off x="4876800" y="4846320"/>
+            <a:ext cx="708186" cy="346760"/>
+          </a:xfrm>
+          <a:prstGeom prst="rect">
+            <a:avLst/>
+          </a:prstGeom>
+          <a:ln w="19050">
+            <a:solidFill>
+              <a:srgbClr val="7030A0"/>
+            </a:solidFill>
+          </a:ln>
+          <a:effectLst/>
+        </p:spPr>
+        <p:style>
+          <a:lnRef idx="1">
+            <a:schemeClr val="accent4"/>
+          </a:lnRef>
+          <a:fillRef idx="2">
+            <a:schemeClr val="accent4"/>
+          </a:fillRef>
+          <a:effectRef idx="1">
+            <a:schemeClr val="accent4"/>
+          </a:effectRef>
+          <a:fontRef idx="minor">
+            <a:schemeClr val="dk1"/>
+          </a:fontRef>
+        </p:style>
+        <p:txBody>
+          <a:bodyPr rtlCol="0" anchor="ctr"/>
+          <a:lstStyle/>
+          <a:p>
+            <a:pPr algn="ctr"/>
+            <a:r>
+              <a:rPr lang="en-US" sz="1050" dirty="0">
+                <a:solidFill>
+                  <a:srgbClr val="7030A0"/>
+                </a:solidFill>
+              </a:rPr>
+              <a:t>Reminder</a:t>
+            </a:r>
+            <a:endParaRPr lang="en-SG" sz="1050" dirty="0">
+              <a:solidFill>
+                <a:srgbClr val="7030A0"/>
+              </a:solidFill>
+            </a:endParaRPr>
+          </a:p>
+        </p:txBody>
+      </p:sp>
+      <p:sp>
+        <p:nvSpPr>
+          <p:cNvPr id="94" name="TextBox 93"/>
+          <p:cNvSpPr txBox="1"/>
+          <p:nvPr/>
+        </p:nvSpPr>
+        <p:spPr>
+          <a:xfrm>
+            <a:off x="4572000" y="4876800"/>
+            <a:ext cx="189257" cy="178683"/>
+          </a:xfrm>
+          <a:prstGeom prst="rect">
+            <a:avLst/>
+          </a:prstGeom>
+          <a:noFill/>
+        </p:spPr>
+        <p:txBody>
+          <a:bodyPr wrap="square" lIns="0" tIns="0" rIns="0" bIns="0" rtlCol="0">
+            <a:noAutofit/>
+          </a:bodyPr>
+          <a:lstStyle/>
+          <a:p>
+            <a:pPr algn="ctr"/>
+            <a:r>
+              <a:rPr lang="en-US" sz="1100" dirty="0">
+                <a:solidFill>
+                  <a:srgbClr val="7030A0"/>
+                </a:solidFill>
+              </a:rPr>
+              <a:t>*</a:t>
+            </a:r>
+            <a:endParaRPr lang="en-SG" sz="1100" dirty="0">
+              <a:solidFill>
+                <a:srgbClr val="7030A0"/>
+              </a:solidFill>
+            </a:endParaRPr>
+          </a:p>
+        </p:txBody>
+      </p:sp>
+      <p:sp>
+        <p:nvSpPr>
+          <p:cNvPr id="95" name="Flowchart: Decision 96"/>
+          <p:cNvSpPr/>
+          <p:nvPr/>
+        </p:nvSpPr>
+        <p:spPr>
+          <a:xfrm>
+            <a:off x="5596128" y="4928616"/>
+            <a:ext cx="236048" cy="173380"/>
+          </a:xfrm>
+          <a:prstGeom prst="flowChartDecision">
+            <a:avLst/>
+          </a:prstGeom>
+          <a:solidFill>
+            <a:srgbClr val="7030A0"/>
+          </a:solidFill>
+          <a:ln w="19050">
+            <a:solidFill>
+              <a:srgbClr val="7030A0"/>
+            </a:solidFill>
+          </a:ln>
+          <a:effectLst/>
+        </p:spPr>
+        <p:style>
+          <a:lnRef idx="1">
+            <a:schemeClr val="accent6"/>
+          </a:lnRef>
+          <a:fillRef idx="2">
+            <a:schemeClr val="accent6"/>
+          </a:fillRef>
+          <a:effectRef idx="1">
+            <a:schemeClr val="accent6"/>
+          </a:effectRef>
+          <a:fontRef idx="minor">
+            <a:schemeClr val="dk1"/>
+          </a:fontRef>
+        </p:style>
+        <p:txBody>
+          <a:bodyPr rtlCol="0" anchor="ctr"/>
+          <a:lstStyle/>
+          <a:p>
+            <a:pPr algn="ctr"/>
+            <a:endParaRPr lang="en-US" sz="1050"/>
+          </a:p>
+        </p:txBody>
+      </p:sp>
+      <p:cxnSp>
+        <p:nvCxnSpPr>
+          <p:cNvPr id="25" name="Straight Arrow Connector 24"/>
+          <p:cNvCxnSpPr/>
+          <p:nvPr/>
+        </p:nvCxnSpPr>
+        <p:spPr>
+          <a:xfrm>
+            <a:off x="5824728" y="5020056"/>
+            <a:ext cx="914400" cy="0"/>
+          </a:xfrm>
+          <a:prstGeom prst="straightConnector1">
+            <a:avLst/>
+          </a:prstGeom>
+          <a:ln>
+            <a:solidFill>
+              <a:srgbClr val="52069D"/>
+            </a:solidFill>
+            <a:tailEnd type="arrow"/>
+          </a:ln>
+          <a:effectLst>
+            <a:outerShdw blurRad="40000" dist="20000" dir="5400000" rotWithShape="0">
+              <a:schemeClr val="bg1">
+                <a:alpha val="38000"/>
+              </a:schemeClr>
+            </a:outerShdw>
+          </a:effectLst>
+        </p:spPr>
+        <p:style>
+          <a:lnRef idx="2">
+            <a:schemeClr val="accent1"/>
+          </a:lnRef>
+          <a:fillRef idx="0">
+            <a:schemeClr val="accent1"/>
+          </a:fillRef>
+          <a:effectRef idx="1">
+            <a:schemeClr val="accent1"/>
+          </a:effectRef>
+          <a:fontRef idx="minor">
+            <a:schemeClr val="tx1"/>
+          </a:fontRef>
+        </p:style>
+      </p:cxnSp>
+      <p:sp>
+        <p:nvSpPr>
+          <p:cNvPr id="96" name="Rectangle 8"/>
+          <p:cNvSpPr/>
+          <p:nvPr/>
+        </p:nvSpPr>
+        <p:spPr>
+          <a:xfrm>
+            <a:off x="6748272" y="4876800"/>
+            <a:ext cx="745803" cy="285783"/>
+          </a:xfrm>
+          <a:prstGeom prst="rect">
+            <a:avLst/>
+          </a:prstGeom>
+          <a:ln w="19050">
+            <a:solidFill>
+              <a:srgbClr val="7030A0"/>
+            </a:solidFill>
+          </a:ln>
+          <a:effectLst/>
+        </p:spPr>
+        <p:style>
+          <a:lnRef idx="1">
+            <a:schemeClr val="accent4"/>
+          </a:lnRef>
+          <a:fillRef idx="2">
+            <a:schemeClr val="accent4"/>
+          </a:fillRef>
+          <a:effectRef idx="1">
+            <a:schemeClr val="accent4"/>
+          </a:effectRef>
+          <a:fontRef idx="minor">
+            <a:schemeClr val="dk1"/>
+          </a:fontRef>
+        </p:style>
+        <p:txBody>
+          <a:bodyPr rtlCol="0" anchor="ctr"/>
+          <a:lstStyle/>
+          <a:p>
+            <a:pPr algn="ctr"/>
+            <a:r>
+              <a:rPr lang="en-US" sz="1050" dirty="0">
+                <a:solidFill>
+                  <a:srgbClr val="7030A0"/>
+                </a:solidFill>
+              </a:rPr>
+              <a:t>DueDate</a:t>
+            </a:r>
+            <a:endParaRPr lang="en-SG" sz="1050" dirty="0">
+              <a:solidFill>
+                <a:srgbClr val="7030A0"/>
+              </a:solidFill>
+            </a:endParaRPr>
+          </a:p>
+        </p:txBody>
+      </p:sp>
     </p:spTree>
     <p:extLst>
       <p:ext uri="{BB962C8B-B14F-4D97-AF65-F5344CB8AC3E}">

</xml_diff>

<commit_message>
Updated DG for v1.4
</commit_message>
<xml_diff>
--- a/docs/diagrams/ModelComponentClassDiagram.pptx
+++ b/docs/diagrams/ModelComponentClassDiagram.pptx
@@ -109,7 +109,7 @@
   </p:defaultTextStyle>
   <p:extLst>
     <p:ext uri="{EFAFB233-063F-42B5-8137-9DF3F51BA10A}">
-      <p15:sldGuideLst xmlns:p15="http://schemas.microsoft.com/office/powerpoint/2012/main" xmlns="">
+      <p15:sldGuideLst xmlns="" xmlns:p15="http://schemas.microsoft.com/office/powerpoint/2012/main">
         <p15:guide id="1" orient="horz" pos="1488">
           <p15:clr>
             <a:srgbClr val="A4A3A4"/>
@@ -212,7 +212,7 @@
           <a:p>
             <a:fld id="{F5CC4B3F-88C1-4FFA-B1B6-F41C21DC6924}" type="datetimeFigureOut">
               <a:rPr lang="en-US" smtClean="0"/>
-              <a:t>10/25/17</a:t>
+              <a:t>11/1/17</a:t>
             </a:fld>
             <a:endParaRPr lang="en-US"/>
           </a:p>
@@ -658,7 +658,7 @@
           <a:p>
             <a:fld id="{78C97017-6FC3-485B-9764-EAC9E56C1D49}" type="datetimeFigureOut">
               <a:rPr lang="en-US" smtClean="0"/>
-              <a:t>10/25/17</a:t>
+              <a:t>11/1/17</a:t>
             </a:fld>
             <a:endParaRPr lang="en-US"/>
           </a:p>
@@ -826,7 +826,7 @@
           <a:p>
             <a:fld id="{78C97017-6FC3-485B-9764-EAC9E56C1D49}" type="datetimeFigureOut">
               <a:rPr lang="en-US" smtClean="0"/>
-              <a:t>10/25/17</a:t>
+              <a:t>11/1/17</a:t>
             </a:fld>
             <a:endParaRPr lang="en-US"/>
           </a:p>
@@ -1004,7 +1004,7 @@
           <a:p>
             <a:fld id="{78C97017-6FC3-485B-9764-EAC9E56C1D49}" type="datetimeFigureOut">
               <a:rPr lang="en-US" smtClean="0"/>
-              <a:t>10/25/17</a:t>
+              <a:t>11/1/17</a:t>
             </a:fld>
             <a:endParaRPr lang="en-US"/>
           </a:p>
@@ -1172,7 +1172,7 @@
           <a:p>
             <a:fld id="{78C97017-6FC3-485B-9764-EAC9E56C1D49}" type="datetimeFigureOut">
               <a:rPr lang="en-US" smtClean="0"/>
-              <a:t>10/25/17</a:t>
+              <a:t>11/1/17</a:t>
             </a:fld>
             <a:endParaRPr lang="en-US"/>
           </a:p>
@@ -1417,7 +1417,7 @@
           <a:p>
             <a:fld id="{78C97017-6FC3-485B-9764-EAC9E56C1D49}" type="datetimeFigureOut">
               <a:rPr lang="en-US" smtClean="0"/>
-              <a:t>10/25/17</a:t>
+              <a:t>11/1/17</a:t>
             </a:fld>
             <a:endParaRPr lang="en-US"/>
           </a:p>
@@ -1702,7 +1702,7 @@
           <a:p>
             <a:fld id="{78C97017-6FC3-485B-9764-EAC9E56C1D49}" type="datetimeFigureOut">
               <a:rPr lang="en-US" smtClean="0"/>
-              <a:t>10/25/17</a:t>
+              <a:t>11/1/17</a:t>
             </a:fld>
             <a:endParaRPr lang="en-US"/>
           </a:p>
@@ -2121,7 +2121,7 @@
           <a:p>
             <a:fld id="{78C97017-6FC3-485B-9764-EAC9E56C1D49}" type="datetimeFigureOut">
               <a:rPr lang="en-US" smtClean="0"/>
-              <a:t>10/25/17</a:t>
+              <a:t>11/1/17</a:t>
             </a:fld>
             <a:endParaRPr lang="en-US"/>
           </a:p>
@@ -2238,7 +2238,7 @@
           <a:p>
             <a:fld id="{78C97017-6FC3-485B-9764-EAC9E56C1D49}" type="datetimeFigureOut">
               <a:rPr lang="en-US" smtClean="0"/>
-              <a:t>10/25/17</a:t>
+              <a:t>11/1/17</a:t>
             </a:fld>
             <a:endParaRPr lang="en-US"/>
           </a:p>
@@ -2333,7 +2333,7 @@
           <a:p>
             <a:fld id="{78C97017-6FC3-485B-9764-EAC9E56C1D49}" type="datetimeFigureOut">
               <a:rPr lang="en-US" smtClean="0"/>
-              <a:t>10/25/17</a:t>
+              <a:t>11/1/17</a:t>
             </a:fld>
             <a:endParaRPr lang="en-US"/>
           </a:p>
@@ -2608,7 +2608,7 @@
           <a:p>
             <a:fld id="{78C97017-6FC3-485B-9764-EAC9E56C1D49}" type="datetimeFigureOut">
               <a:rPr lang="en-US" smtClean="0"/>
-              <a:t>10/25/17</a:t>
+              <a:t>11/1/17</a:t>
             </a:fld>
             <a:endParaRPr lang="en-US"/>
           </a:p>
@@ -2860,7 +2860,7 @@
           <a:p>
             <a:fld id="{78C97017-6FC3-485B-9764-EAC9E56C1D49}" type="datetimeFigureOut">
               <a:rPr lang="en-US" smtClean="0"/>
-              <a:t>10/25/17</a:t>
+              <a:t>11/1/17</a:t>
             </a:fld>
             <a:endParaRPr lang="en-US"/>
           </a:p>
@@ -3071,7 +3071,7 @@
           <a:p>
             <a:fld id="{78C97017-6FC3-485B-9764-EAC9E56C1D49}" type="datetimeFigureOut">
               <a:rPr lang="en-US" smtClean="0"/>
-              <a:t>10/25/17</a:t>
+              <a:t>11/1/17</a:t>
             </a:fld>
             <a:endParaRPr lang="en-US"/>
           </a:p>
@@ -5863,7 +5863,7 @@
           <p:cNvPr id="55" name="Rectangle 8">
             <a:extLst>
               <a:ext uri="{FF2B5EF4-FFF2-40B4-BE49-F238E27FC236}">
-                <a16:creationId xmlns:a16="http://schemas.microsoft.com/office/drawing/2014/main" xmlns="" id="{A552645E-05DD-4025-8783-3E0B4013A54F}"/>
+                <a16:creationId xmlns="" xmlns:a16="http://schemas.microsoft.com/office/drawing/2014/main" id="{A552645E-05DD-4025-8783-3E0B4013A54F}"/>
               </a:ext>
             </a:extLst>
           </p:cNvPr>
@@ -5925,7 +5925,7 @@
           <p:cNvPr id="73" name="Rectangle 8">
             <a:extLst>
               <a:ext uri="{FF2B5EF4-FFF2-40B4-BE49-F238E27FC236}">
-                <a16:creationId xmlns:a16="http://schemas.microsoft.com/office/drawing/2014/main" xmlns="" id="{8BE37FFA-90F7-4963-93D6-CBFD83A061D0}"/>
+                <a16:creationId xmlns="" xmlns:a16="http://schemas.microsoft.com/office/drawing/2014/main" id="{8BE37FFA-90F7-4963-93D6-CBFD83A061D0}"/>
               </a:ext>
             </a:extLst>
           </p:cNvPr>
@@ -5982,7 +5982,7 @@
           <p:cNvPr id="87" name="Elbow Connector 49">
             <a:extLst>
               <a:ext uri="{FF2B5EF4-FFF2-40B4-BE49-F238E27FC236}">
-                <a16:creationId xmlns:a16="http://schemas.microsoft.com/office/drawing/2014/main" xmlns="" id="{9319264E-54F8-42DB-83F4-979CE961254C}"/>
+                <a16:creationId xmlns="" xmlns:a16="http://schemas.microsoft.com/office/drawing/2014/main" id="{9319264E-54F8-42DB-83F4-979CE961254C}"/>
               </a:ext>
             </a:extLst>
           </p:cNvPr>
@@ -6029,7 +6029,7 @@
           <p:cNvPr id="88" name="Elbow Connector 49">
             <a:extLst>
               <a:ext uri="{FF2B5EF4-FFF2-40B4-BE49-F238E27FC236}">
-                <a16:creationId xmlns:a16="http://schemas.microsoft.com/office/drawing/2014/main" xmlns="" id="{3FDD8E82-3CDF-4873-B838-6520DEECAF19}"/>
+                <a16:creationId xmlns="" xmlns:a16="http://schemas.microsoft.com/office/drawing/2014/main" id="{3FDD8E82-3CDF-4873-B838-6520DEECAF19}"/>
               </a:ext>
             </a:extLst>
           </p:cNvPr>
@@ -6650,23 +6650,276 @@
           </a:p>
         </p:txBody>
       </p:sp>
+      <p:sp>
+        <p:nvSpPr>
+          <p:cNvPr id="96" name="Rectangle 8"/>
+          <p:cNvSpPr/>
+          <p:nvPr/>
+        </p:nvSpPr>
+        <p:spPr>
+          <a:xfrm>
+            <a:off x="6705600" y="4648200"/>
+            <a:ext cx="745803" cy="285783"/>
+          </a:xfrm>
+          <a:prstGeom prst="rect">
+            <a:avLst/>
+          </a:prstGeom>
+          <a:ln w="19050">
+            <a:solidFill>
+              <a:srgbClr val="7030A0"/>
+            </a:solidFill>
+          </a:ln>
+          <a:effectLst/>
+        </p:spPr>
+        <p:style>
+          <a:lnRef idx="1">
+            <a:schemeClr val="accent4"/>
+          </a:lnRef>
+          <a:fillRef idx="2">
+            <a:schemeClr val="accent4"/>
+          </a:fillRef>
+          <a:effectRef idx="1">
+            <a:schemeClr val="accent4"/>
+          </a:effectRef>
+          <a:fontRef idx="minor">
+            <a:schemeClr val="dk1"/>
+          </a:fontRef>
+        </p:style>
+        <p:txBody>
+          <a:bodyPr rtlCol="0" anchor="ctr"/>
+          <a:lstStyle/>
+          <a:p>
+            <a:pPr algn="ctr"/>
+            <a:r>
+              <a:rPr lang="en-US" sz="1050" dirty="0">
+                <a:solidFill>
+                  <a:srgbClr val="7030A0"/>
+                </a:solidFill>
+              </a:rPr>
+              <a:t>Date</a:t>
+            </a:r>
+            <a:endParaRPr lang="en-SG" sz="1050" dirty="0">
+              <a:solidFill>
+                <a:srgbClr val="7030A0"/>
+              </a:solidFill>
+            </a:endParaRPr>
+          </a:p>
+        </p:txBody>
+      </p:sp>
+      <p:sp>
+        <p:nvSpPr>
+          <p:cNvPr id="90" name="Rectangle 8"/>
+          <p:cNvSpPr/>
+          <p:nvPr/>
+        </p:nvSpPr>
+        <p:spPr>
+          <a:xfrm>
+            <a:off x="6705600" y="5105400"/>
+            <a:ext cx="745803" cy="285783"/>
+          </a:xfrm>
+          <a:prstGeom prst="rect">
+            <a:avLst/>
+          </a:prstGeom>
+          <a:ln w="19050">
+            <a:solidFill>
+              <a:srgbClr val="7030A0"/>
+            </a:solidFill>
+          </a:ln>
+          <a:effectLst/>
+        </p:spPr>
+        <p:style>
+          <a:lnRef idx="1">
+            <a:schemeClr val="accent4"/>
+          </a:lnRef>
+          <a:fillRef idx="2">
+            <a:schemeClr val="accent4"/>
+          </a:fillRef>
+          <a:effectRef idx="1">
+            <a:schemeClr val="accent4"/>
+          </a:effectRef>
+          <a:fontRef idx="minor">
+            <a:schemeClr val="dk1"/>
+          </a:fontRef>
+        </p:style>
+        <p:txBody>
+          <a:bodyPr rtlCol="0" anchor="ctr"/>
+          <a:lstStyle/>
+          <a:p>
+            <a:pPr algn="ctr"/>
+            <a:r>
+              <a:rPr lang="en-US" sz="1050" dirty="0">
+                <a:solidFill>
+                  <a:srgbClr val="7030A0"/>
+                </a:solidFill>
+              </a:rPr>
+              <a:t>Time</a:t>
+            </a:r>
+            <a:endParaRPr lang="en-SG" sz="1050" dirty="0">
+              <a:solidFill>
+                <a:srgbClr val="7030A0"/>
+              </a:solidFill>
+            </a:endParaRPr>
+          </a:p>
+        </p:txBody>
+      </p:sp>
+      <p:grpSp>
+        <p:nvGrpSpPr>
+          <p:cNvPr id="16" name="Group 15"/>
+          <p:cNvGrpSpPr/>
+          <p:nvPr/>
+        </p:nvGrpSpPr>
+        <p:grpSpPr>
+          <a:xfrm>
+            <a:off x="5833872" y="4782312"/>
+            <a:ext cx="381000" cy="457200"/>
+            <a:chOff x="5867400" y="4800600"/>
+            <a:chExt cx="381000" cy="457200"/>
+          </a:xfrm>
+        </p:grpSpPr>
+        <p:cxnSp>
+          <p:nvCxnSpPr>
+            <p:cNvPr id="6" name="Straight Connector 5"/>
+            <p:cNvCxnSpPr/>
+            <p:nvPr/>
+          </p:nvCxnSpPr>
+          <p:spPr>
+            <a:xfrm>
+              <a:off x="5867400" y="5029200"/>
+              <a:ext cx="381000" cy="0"/>
+            </a:xfrm>
+            <a:prstGeom prst="line">
+              <a:avLst/>
+            </a:prstGeom>
+            <a:ln>
+              <a:solidFill>
+                <a:srgbClr val="5605A6"/>
+              </a:solidFill>
+            </a:ln>
+            <a:effectLst>
+              <a:outerShdw blurRad="40000" dist="20000" dir="5400000" rotWithShape="0">
+                <a:schemeClr val="bg1">
+                  <a:alpha val="38000"/>
+                </a:schemeClr>
+              </a:outerShdw>
+            </a:effectLst>
+          </p:spPr>
+          <p:style>
+            <a:lnRef idx="2">
+              <a:schemeClr val="accent1"/>
+            </a:lnRef>
+            <a:fillRef idx="0">
+              <a:schemeClr val="accent1"/>
+            </a:fillRef>
+            <a:effectRef idx="1">
+              <a:schemeClr val="accent1"/>
+            </a:effectRef>
+            <a:fontRef idx="minor">
+              <a:schemeClr val="tx1"/>
+            </a:fontRef>
+          </p:style>
+        </p:cxnSp>
+        <p:cxnSp>
+          <p:nvCxnSpPr>
+            <p:cNvPr id="8" name="Straight Connector 7"/>
+            <p:cNvCxnSpPr/>
+            <p:nvPr/>
+          </p:nvCxnSpPr>
+          <p:spPr>
+            <a:xfrm flipV="1">
+              <a:off x="6248400" y="4800600"/>
+              <a:ext cx="0" cy="228600"/>
+            </a:xfrm>
+            <a:prstGeom prst="line">
+              <a:avLst/>
+            </a:prstGeom>
+            <a:ln>
+              <a:solidFill>
+                <a:srgbClr val="5605A6"/>
+              </a:solidFill>
+            </a:ln>
+            <a:effectLst>
+              <a:outerShdw blurRad="40000" dist="20000" dir="5400000" rotWithShape="0">
+                <a:schemeClr val="bg1">
+                  <a:alpha val="38000"/>
+                </a:schemeClr>
+              </a:outerShdw>
+            </a:effectLst>
+          </p:spPr>
+          <p:style>
+            <a:lnRef idx="2">
+              <a:schemeClr val="accent1"/>
+            </a:lnRef>
+            <a:fillRef idx="0">
+              <a:schemeClr val="accent1"/>
+            </a:fillRef>
+            <a:effectRef idx="1">
+              <a:schemeClr val="accent1"/>
+            </a:effectRef>
+            <a:fontRef idx="minor">
+              <a:schemeClr val="tx1"/>
+            </a:fontRef>
+          </p:style>
+        </p:cxnSp>
+        <p:cxnSp>
+          <p:nvCxnSpPr>
+            <p:cNvPr id="12" name="Straight Connector 11"/>
+            <p:cNvCxnSpPr/>
+            <p:nvPr/>
+          </p:nvCxnSpPr>
+          <p:spPr>
+            <a:xfrm>
+              <a:off x="6248400" y="5029200"/>
+              <a:ext cx="0" cy="228600"/>
+            </a:xfrm>
+            <a:prstGeom prst="line">
+              <a:avLst/>
+            </a:prstGeom>
+            <a:ln>
+              <a:solidFill>
+                <a:srgbClr val="5605A6"/>
+              </a:solidFill>
+            </a:ln>
+            <a:effectLst>
+              <a:outerShdw blurRad="40000" dist="20000" dir="5400000" rotWithShape="0">
+                <a:schemeClr val="bg1">
+                  <a:alpha val="38000"/>
+                </a:schemeClr>
+              </a:outerShdw>
+            </a:effectLst>
+          </p:spPr>
+          <p:style>
+            <a:lnRef idx="2">
+              <a:schemeClr val="accent1"/>
+            </a:lnRef>
+            <a:fillRef idx="0">
+              <a:schemeClr val="accent1"/>
+            </a:fillRef>
+            <a:effectRef idx="1">
+              <a:schemeClr val="accent1"/>
+            </a:effectRef>
+            <a:fontRef idx="minor">
+              <a:schemeClr val="tx1"/>
+            </a:fontRef>
+          </p:style>
+        </p:cxnSp>
+      </p:grpSp>
       <p:cxnSp>
         <p:nvCxnSpPr>
-          <p:cNvPr id="25" name="Straight Arrow Connector 24"/>
+          <p:cNvPr id="24" name="Straight Arrow Connector 23"/>
           <p:cNvCxnSpPr/>
           <p:nvPr/>
         </p:nvCxnSpPr>
         <p:spPr>
           <a:xfrm>
-            <a:off x="5824728" y="5020056"/>
-            <a:ext cx="914400" cy="0"/>
+            <a:off x="6217920" y="4791456"/>
+            <a:ext cx="484632" cy="0"/>
           </a:xfrm>
           <a:prstGeom prst="straightConnector1">
             <a:avLst/>
           </a:prstGeom>
           <a:ln>
             <a:solidFill>
-              <a:srgbClr val="52069D"/>
+              <a:srgbClr val="5605A6"/>
             </a:solidFill>
             <a:tailEnd type="arrow"/>
           </a:ln>
@@ -6693,59 +6946,112 @@
           </a:fontRef>
         </p:style>
       </p:cxnSp>
-      <p:sp>
-        <p:nvSpPr>
-          <p:cNvPr id="96" name="Rectangle 8"/>
-          <p:cNvSpPr/>
+      <p:cxnSp>
+        <p:nvCxnSpPr>
+          <p:cNvPr id="91" name="Straight Arrow Connector 90"/>
+          <p:cNvCxnSpPr/>
           <p:nvPr/>
-        </p:nvSpPr>
-        <p:spPr>
-          <a:xfrm>
-            <a:off x="6748272" y="4876800"/>
-            <a:ext cx="745803" cy="285783"/>
-          </a:xfrm>
-          <a:prstGeom prst="rect">
-            <a:avLst/>
-          </a:prstGeom>
-          <a:ln w="19050">
+        </p:nvCxnSpPr>
+        <p:spPr>
+          <a:xfrm>
+            <a:off x="6217920" y="5230368"/>
+            <a:ext cx="484632" cy="0"/>
+          </a:xfrm>
+          <a:prstGeom prst="straightConnector1">
+            <a:avLst/>
+          </a:prstGeom>
+          <a:ln>
             <a:solidFill>
-              <a:srgbClr val="7030A0"/>
+              <a:srgbClr val="5605A6"/>
             </a:solidFill>
+            <a:tailEnd type="arrow"/>
           </a:ln>
-          <a:effectLst/>
+          <a:effectLst>
+            <a:outerShdw blurRad="40000" dist="20000" dir="5400000" rotWithShape="0">
+              <a:schemeClr val="bg1">
+                <a:alpha val="38000"/>
+              </a:schemeClr>
+            </a:outerShdw>
+          </a:effectLst>
         </p:spPr>
         <p:style>
-          <a:lnRef idx="1">
-            <a:schemeClr val="accent4"/>
+          <a:lnRef idx="2">
+            <a:schemeClr val="accent1"/>
           </a:lnRef>
-          <a:fillRef idx="2">
-            <a:schemeClr val="accent4"/>
+          <a:fillRef idx="0">
+            <a:schemeClr val="accent1"/>
           </a:fillRef>
           <a:effectRef idx="1">
-            <a:schemeClr val="accent4"/>
+            <a:schemeClr val="accent1"/>
           </a:effectRef>
           <a:fontRef idx="minor">
-            <a:schemeClr val="dk1"/>
+            <a:schemeClr val="tx1"/>
           </a:fontRef>
         </p:style>
-        <p:txBody>
-          <a:bodyPr rtlCol="0" anchor="ctr"/>
-          <a:lstStyle/>
-          <a:p>
-            <a:pPr algn="ctr"/>
-            <a:r>
-              <a:rPr lang="en-US" sz="1050" dirty="0">
+      </p:cxnSp>
+      <p:sp>
+        <p:nvSpPr>
+          <p:cNvPr id="26" name="TextBox 25"/>
+          <p:cNvSpPr txBox="1"/>
+          <p:nvPr/>
+        </p:nvSpPr>
+        <p:spPr>
+          <a:xfrm>
+            <a:off x="6400800" y="4535424"/>
+            <a:ext cx="256162" cy="261610"/>
+          </a:xfrm>
+          <a:prstGeom prst="rect">
+            <a:avLst/>
+          </a:prstGeom>
+          <a:noFill/>
+        </p:spPr>
+        <p:txBody>
+          <a:bodyPr wrap="none" rtlCol="0">
+            <a:spAutoFit/>
+          </a:bodyPr>
+          <a:lstStyle/>
+          <a:p>
+            <a:r>
+              <a:rPr lang="en-US" sz="1100">
                 <a:solidFill>
-                  <a:srgbClr val="7030A0"/>
+                  <a:srgbClr val="5504A6"/>
                 </a:solidFill>
               </a:rPr>
-              <a:t>DueDate</a:t>
-            </a:r>
-            <a:endParaRPr lang="en-SG" sz="1050" dirty="0">
-              <a:solidFill>
-                <a:srgbClr val="7030A0"/>
-              </a:solidFill>
-            </a:endParaRPr>
+              <a:t>1</a:t>
+            </a:r>
+          </a:p>
+        </p:txBody>
+      </p:sp>
+      <p:sp>
+        <p:nvSpPr>
+          <p:cNvPr id="98" name="TextBox 97"/>
+          <p:cNvSpPr txBox="1"/>
+          <p:nvPr/>
+        </p:nvSpPr>
+        <p:spPr>
+          <a:xfrm>
+            <a:off x="6400800" y="4953000"/>
+            <a:ext cx="256162" cy="261610"/>
+          </a:xfrm>
+          <a:prstGeom prst="rect">
+            <a:avLst/>
+          </a:prstGeom>
+          <a:noFill/>
+        </p:spPr>
+        <p:txBody>
+          <a:bodyPr wrap="none" rtlCol="0">
+            <a:spAutoFit/>
+          </a:bodyPr>
+          <a:lstStyle/>
+          <a:p>
+            <a:r>
+              <a:rPr lang="en-US" sz="1100">
+                <a:solidFill>
+                  <a:srgbClr val="5504A6"/>
+                </a:solidFill>
+              </a:rPr>
+              <a:t>1</a:t>
+            </a:r>
           </a:p>
         </p:txBody>
       </p:sp>

</xml_diff>

<commit_message>
Updated diagrams for DG for v1.5
</commit_message>
<xml_diff>
--- a/docs/diagrams/ModelComponentClassDiagram.pptx
+++ b/docs/diagrams/ModelComponentClassDiagram.pptx
@@ -109,7 +109,7 @@
   </p:defaultTextStyle>
   <p:extLst>
     <p:ext uri="{EFAFB233-063F-42B5-8137-9DF3F51BA10A}">
-      <p15:sldGuideLst xmlns="" xmlns:p15="http://schemas.microsoft.com/office/powerpoint/2012/main">
+      <p15:sldGuideLst xmlns:p15="http://schemas.microsoft.com/office/powerpoint/2012/main" xmlns="">
         <p15:guide id="1" orient="horz" pos="1488">
           <p15:clr>
             <a:srgbClr val="A4A3A4"/>
@@ -212,7 +212,7 @@
           <a:p>
             <a:fld id="{F5CC4B3F-88C1-4FFA-B1B6-F41C21DC6924}" type="datetimeFigureOut">
               <a:rPr lang="en-US" smtClean="0"/>
-              <a:t>11/1/17</a:t>
+              <a:t>11/5/17</a:t>
             </a:fld>
             <a:endParaRPr lang="en-US"/>
           </a:p>
@@ -658,7 +658,7 @@
           <a:p>
             <a:fld id="{78C97017-6FC3-485B-9764-EAC9E56C1D49}" type="datetimeFigureOut">
               <a:rPr lang="en-US" smtClean="0"/>
-              <a:t>11/1/17</a:t>
+              <a:t>11/5/17</a:t>
             </a:fld>
             <a:endParaRPr lang="en-US"/>
           </a:p>
@@ -826,7 +826,7 @@
           <a:p>
             <a:fld id="{78C97017-6FC3-485B-9764-EAC9E56C1D49}" type="datetimeFigureOut">
               <a:rPr lang="en-US" smtClean="0"/>
-              <a:t>11/1/17</a:t>
+              <a:t>11/5/17</a:t>
             </a:fld>
             <a:endParaRPr lang="en-US"/>
           </a:p>
@@ -1004,7 +1004,7 @@
           <a:p>
             <a:fld id="{78C97017-6FC3-485B-9764-EAC9E56C1D49}" type="datetimeFigureOut">
               <a:rPr lang="en-US" smtClean="0"/>
-              <a:t>11/1/17</a:t>
+              <a:t>11/5/17</a:t>
             </a:fld>
             <a:endParaRPr lang="en-US"/>
           </a:p>
@@ -1172,7 +1172,7 @@
           <a:p>
             <a:fld id="{78C97017-6FC3-485B-9764-EAC9E56C1D49}" type="datetimeFigureOut">
               <a:rPr lang="en-US" smtClean="0"/>
-              <a:t>11/1/17</a:t>
+              <a:t>11/5/17</a:t>
             </a:fld>
             <a:endParaRPr lang="en-US"/>
           </a:p>
@@ -1417,7 +1417,7 @@
           <a:p>
             <a:fld id="{78C97017-6FC3-485B-9764-EAC9E56C1D49}" type="datetimeFigureOut">
               <a:rPr lang="en-US" smtClean="0"/>
-              <a:t>11/1/17</a:t>
+              <a:t>11/5/17</a:t>
             </a:fld>
             <a:endParaRPr lang="en-US"/>
           </a:p>
@@ -1702,7 +1702,7 @@
           <a:p>
             <a:fld id="{78C97017-6FC3-485B-9764-EAC9E56C1D49}" type="datetimeFigureOut">
               <a:rPr lang="en-US" smtClean="0"/>
-              <a:t>11/1/17</a:t>
+              <a:t>11/5/17</a:t>
             </a:fld>
             <a:endParaRPr lang="en-US"/>
           </a:p>
@@ -2121,7 +2121,7 @@
           <a:p>
             <a:fld id="{78C97017-6FC3-485B-9764-EAC9E56C1D49}" type="datetimeFigureOut">
               <a:rPr lang="en-US" smtClean="0"/>
-              <a:t>11/1/17</a:t>
+              <a:t>11/5/17</a:t>
             </a:fld>
             <a:endParaRPr lang="en-US"/>
           </a:p>
@@ -2238,7 +2238,7 @@
           <a:p>
             <a:fld id="{78C97017-6FC3-485B-9764-EAC9E56C1D49}" type="datetimeFigureOut">
               <a:rPr lang="en-US" smtClean="0"/>
-              <a:t>11/1/17</a:t>
+              <a:t>11/5/17</a:t>
             </a:fld>
             <a:endParaRPr lang="en-US"/>
           </a:p>
@@ -2333,7 +2333,7 @@
           <a:p>
             <a:fld id="{78C97017-6FC3-485B-9764-EAC9E56C1D49}" type="datetimeFigureOut">
               <a:rPr lang="en-US" smtClean="0"/>
-              <a:t>11/1/17</a:t>
+              <a:t>11/5/17</a:t>
             </a:fld>
             <a:endParaRPr lang="en-US"/>
           </a:p>
@@ -2608,7 +2608,7 @@
           <a:p>
             <a:fld id="{78C97017-6FC3-485B-9764-EAC9E56C1D49}" type="datetimeFigureOut">
               <a:rPr lang="en-US" smtClean="0"/>
-              <a:t>11/1/17</a:t>
+              <a:t>11/5/17</a:t>
             </a:fld>
             <a:endParaRPr lang="en-US"/>
           </a:p>
@@ -2860,7 +2860,7 @@
           <a:p>
             <a:fld id="{78C97017-6FC3-485B-9764-EAC9E56C1D49}" type="datetimeFigureOut">
               <a:rPr lang="en-US" smtClean="0"/>
-              <a:t>11/1/17</a:t>
+              <a:t>11/5/17</a:t>
             </a:fld>
             <a:endParaRPr lang="en-US"/>
           </a:p>
@@ -3071,7 +3071,7 @@
           <a:p>
             <a:fld id="{78C97017-6FC3-485B-9764-EAC9E56C1D49}" type="datetimeFigureOut">
               <a:rPr lang="en-US" smtClean="0"/>
-              <a:t>11/1/17</a:t>
+              <a:t>11/5/17</a:t>
             </a:fld>
             <a:endParaRPr lang="en-US"/>
           </a:p>
@@ -3454,8 +3454,8 @@
         </p:nvSpPr>
         <p:spPr>
           <a:xfrm>
-            <a:off x="1119865" y="1727200"/>
-            <a:ext cx="7490735" cy="3759200"/>
+            <a:off x="1143000" y="1676400"/>
+            <a:ext cx="7490735" cy="4267200"/>
           </a:xfrm>
           <a:prstGeom prst="roundRect">
             <a:avLst>
@@ -5863,7 +5863,7 @@
           <p:cNvPr id="55" name="Rectangle 8">
             <a:extLst>
               <a:ext uri="{FF2B5EF4-FFF2-40B4-BE49-F238E27FC236}">
-                <a16:creationId xmlns="" xmlns:a16="http://schemas.microsoft.com/office/drawing/2014/main" id="{A552645E-05DD-4025-8783-3E0B4013A54F}"/>
+                <a16:creationId xmlns:a16="http://schemas.microsoft.com/office/drawing/2014/main" xmlns="" id="{A552645E-05DD-4025-8783-3E0B4013A54F}"/>
               </a:ext>
             </a:extLst>
           </p:cNvPr>
@@ -5925,7 +5925,7 @@
           <p:cNvPr id="73" name="Rectangle 8">
             <a:extLst>
               <a:ext uri="{FF2B5EF4-FFF2-40B4-BE49-F238E27FC236}">
-                <a16:creationId xmlns="" xmlns:a16="http://schemas.microsoft.com/office/drawing/2014/main" id="{8BE37FFA-90F7-4963-93D6-CBFD83A061D0}"/>
+                <a16:creationId xmlns:a16="http://schemas.microsoft.com/office/drawing/2014/main" xmlns="" id="{8BE37FFA-90F7-4963-93D6-CBFD83A061D0}"/>
               </a:ext>
             </a:extLst>
           </p:cNvPr>
@@ -5982,7 +5982,7 @@
           <p:cNvPr id="87" name="Elbow Connector 49">
             <a:extLst>
               <a:ext uri="{FF2B5EF4-FFF2-40B4-BE49-F238E27FC236}">
-                <a16:creationId xmlns="" xmlns:a16="http://schemas.microsoft.com/office/drawing/2014/main" id="{9319264E-54F8-42DB-83F4-979CE961254C}"/>
+                <a16:creationId xmlns:a16="http://schemas.microsoft.com/office/drawing/2014/main" xmlns="" id="{9319264E-54F8-42DB-83F4-979CE961254C}"/>
               </a:ext>
             </a:extLst>
           </p:cNvPr>
@@ -6029,7 +6029,7 @@
           <p:cNvPr id="88" name="Elbow Connector 49">
             <a:extLst>
               <a:ext uri="{FF2B5EF4-FFF2-40B4-BE49-F238E27FC236}">
-                <a16:creationId xmlns="" xmlns:a16="http://schemas.microsoft.com/office/drawing/2014/main" id="{3FDD8E82-3CDF-4873-B838-6520DEECAF19}"/>
+                <a16:creationId xmlns:a16="http://schemas.microsoft.com/office/drawing/2014/main" xmlns="" id="{3FDD8E82-3CDF-4873-B838-6520DEECAF19}"/>
               </a:ext>
             </a:extLst>
           </p:cNvPr>
@@ -6432,7 +6432,7 @@
         <p:spPr>
           <a:xfrm>
             <a:off x="3977640" y="4419600"/>
-            <a:ext cx="0" cy="609600"/>
+            <a:ext cx="0" cy="777240"/>
           </a:xfrm>
           <a:prstGeom prst="line">
             <a:avLst/>
@@ -6473,7 +6473,7 @@
         </p:nvCxnSpPr>
         <p:spPr>
           <a:xfrm>
-            <a:off x="3962400" y="5029200"/>
+            <a:off x="3962400" y="5212080"/>
             <a:ext cx="914400" cy="0"/>
           </a:xfrm>
           <a:prstGeom prst="straightConnector1">
@@ -6516,7 +6516,7 @@
         </p:nvSpPr>
         <p:spPr>
           <a:xfrm>
-            <a:off x="4876800" y="4846320"/>
+            <a:off x="4876800" y="5047488"/>
             <a:ext cx="708186" cy="346760"/>
           </a:xfrm>
           <a:prstGeom prst="rect">
@@ -6572,7 +6572,7 @@
         </p:nvSpPr>
         <p:spPr>
           <a:xfrm>
-            <a:off x="4572000" y="4876800"/>
+            <a:off x="4572000" y="5029200"/>
             <a:ext cx="189257" cy="178683"/>
           </a:xfrm>
           <a:prstGeom prst="rect">
@@ -6611,7 +6611,7 @@
         </p:nvSpPr>
         <p:spPr>
           <a:xfrm>
-            <a:off x="5596128" y="4928616"/>
+            <a:off x="5596128" y="5138928"/>
             <a:ext cx="236048" cy="173380"/>
           </a:xfrm>
           <a:prstGeom prst="flowChartDecision">
@@ -6770,8 +6770,8 @@
         </p:nvGrpSpPr>
         <p:grpSpPr>
           <a:xfrm>
-            <a:off x="5833872" y="4782312"/>
-            <a:ext cx="381000" cy="457200"/>
+            <a:off x="5824728" y="4800600"/>
+            <a:ext cx="381000" cy="838200"/>
             <a:chOff x="5867400" y="4800600"/>
             <a:chExt cx="381000" cy="457200"/>
           </a:xfrm>
@@ -6903,101 +6903,185 @@
           </p:style>
         </p:cxnSp>
       </p:grpSp>
+      <p:sp>
+        <p:nvSpPr>
+          <p:cNvPr id="101" name="Rectangle 8"/>
+          <p:cNvSpPr/>
+          <p:nvPr/>
+        </p:nvSpPr>
+        <p:spPr>
+          <a:xfrm>
+            <a:off x="6705600" y="5562600"/>
+            <a:ext cx="745803" cy="285783"/>
+          </a:xfrm>
+          <a:prstGeom prst="rect">
+            <a:avLst/>
+          </a:prstGeom>
+          <a:ln w="19050">
+            <a:solidFill>
+              <a:srgbClr val="7030A0"/>
+            </a:solidFill>
+          </a:ln>
+          <a:effectLst/>
+        </p:spPr>
+        <p:style>
+          <a:lnRef idx="1">
+            <a:schemeClr val="accent4"/>
+          </a:lnRef>
+          <a:fillRef idx="2">
+            <a:schemeClr val="accent4"/>
+          </a:fillRef>
+          <a:effectRef idx="1">
+            <a:schemeClr val="accent4"/>
+          </a:effectRef>
+          <a:fontRef idx="minor">
+            <a:schemeClr val="dk1"/>
+          </a:fontRef>
+        </p:style>
+        <p:txBody>
+          <a:bodyPr rtlCol="0" anchor="ctr"/>
+          <a:lstStyle/>
+          <a:p>
+            <a:pPr algn="ctr"/>
+            <a:r>
+              <a:rPr lang="en-US" sz="1050" dirty="0">
+                <a:solidFill>
+                  <a:srgbClr val="7030A0"/>
+                </a:solidFill>
+              </a:rPr>
+              <a:t>Status</a:t>
+            </a:r>
+            <a:endParaRPr lang="en-SG" sz="1050" dirty="0">
+              <a:solidFill>
+                <a:srgbClr val="7030A0"/>
+              </a:solidFill>
+            </a:endParaRPr>
+          </a:p>
+        </p:txBody>
+      </p:sp>
       <p:cxnSp>
         <p:nvCxnSpPr>
-          <p:cNvPr id="24" name="Straight Arrow Connector 23"/>
+          <p:cNvPr id="102" name="Straight Arrow Connector 101"/>
           <p:cNvCxnSpPr/>
           <p:nvPr/>
         </p:nvCxnSpPr>
         <p:spPr>
           <a:xfrm>
-            <a:off x="6217920" y="4791456"/>
-            <a:ext cx="484632" cy="0"/>
+            <a:off x="6199632" y="4800600"/>
+            <a:ext cx="502920" cy="0"/>
           </a:xfrm>
           <a:prstGeom prst="straightConnector1">
             <a:avLst/>
           </a:prstGeom>
-          <a:ln>
+          <a:ln w="25400">
             <a:solidFill>
               <a:srgbClr val="5605A6"/>
             </a:solidFill>
-            <a:tailEnd type="arrow"/>
+            <a:headEnd type="none" w="med" len="med"/>
+            <a:tailEnd type="arrow" w="med" len="med"/>
           </a:ln>
-          <a:effectLst>
-            <a:outerShdw blurRad="40000" dist="20000" dir="5400000" rotWithShape="0">
-              <a:schemeClr val="bg1">
-                <a:alpha val="38000"/>
-              </a:schemeClr>
-            </a:outerShdw>
-          </a:effectLst>
+          <a:effectLst/>
         </p:spPr>
         <p:style>
-          <a:lnRef idx="2">
-            <a:schemeClr val="accent1"/>
+          <a:lnRef idx="1">
+            <a:schemeClr val="accent2"/>
           </a:lnRef>
-          <a:fillRef idx="0">
-            <a:schemeClr val="accent1"/>
+          <a:fillRef idx="2">
+            <a:schemeClr val="accent2"/>
           </a:fillRef>
           <a:effectRef idx="1">
-            <a:schemeClr val="accent1"/>
+            <a:schemeClr val="accent2"/>
           </a:effectRef>
           <a:fontRef idx="minor">
-            <a:schemeClr val="tx1"/>
+            <a:schemeClr val="dk1"/>
           </a:fontRef>
         </p:style>
       </p:cxnSp>
       <p:cxnSp>
         <p:nvCxnSpPr>
-          <p:cNvPr id="91" name="Straight Arrow Connector 90"/>
+          <p:cNvPr id="103" name="Straight Arrow Connector 102"/>
           <p:cNvCxnSpPr/>
           <p:nvPr/>
         </p:nvCxnSpPr>
         <p:spPr>
           <a:xfrm>
-            <a:off x="6217920" y="5230368"/>
-            <a:ext cx="484632" cy="0"/>
+            <a:off x="6199632" y="5221224"/>
+            <a:ext cx="502920" cy="0"/>
           </a:xfrm>
           <a:prstGeom prst="straightConnector1">
             <a:avLst/>
           </a:prstGeom>
-          <a:ln>
+          <a:ln w="25400">
             <a:solidFill>
               <a:srgbClr val="5605A6"/>
             </a:solidFill>
-            <a:tailEnd type="arrow"/>
+            <a:headEnd type="none" w="med" len="med"/>
+            <a:tailEnd type="arrow" w="med" len="med"/>
           </a:ln>
-          <a:effectLst>
-            <a:outerShdw blurRad="40000" dist="20000" dir="5400000" rotWithShape="0">
-              <a:schemeClr val="bg1">
-                <a:alpha val="38000"/>
-              </a:schemeClr>
-            </a:outerShdw>
-          </a:effectLst>
+          <a:effectLst/>
         </p:spPr>
         <p:style>
-          <a:lnRef idx="2">
-            <a:schemeClr val="accent1"/>
+          <a:lnRef idx="1">
+            <a:schemeClr val="accent2"/>
           </a:lnRef>
-          <a:fillRef idx="0">
-            <a:schemeClr val="accent1"/>
+          <a:fillRef idx="2">
+            <a:schemeClr val="accent2"/>
           </a:fillRef>
           <a:effectRef idx="1">
-            <a:schemeClr val="accent1"/>
+            <a:schemeClr val="accent2"/>
           </a:effectRef>
           <a:fontRef idx="minor">
-            <a:schemeClr val="tx1"/>
+            <a:schemeClr val="dk1"/>
           </a:fontRef>
         </p:style>
       </p:cxnSp>
-      <p:sp>
-        <p:nvSpPr>
-          <p:cNvPr id="26" name="TextBox 25"/>
+      <p:cxnSp>
+        <p:nvCxnSpPr>
+          <p:cNvPr id="104" name="Straight Arrow Connector 103"/>
+          <p:cNvCxnSpPr/>
+          <p:nvPr/>
+        </p:nvCxnSpPr>
+        <p:spPr>
+          <a:xfrm>
+            <a:off x="6199632" y="5638800"/>
+            <a:ext cx="502920" cy="0"/>
+          </a:xfrm>
+          <a:prstGeom prst="straightConnector1">
+            <a:avLst/>
+          </a:prstGeom>
+          <a:ln w="25400">
+            <a:solidFill>
+              <a:srgbClr val="5605A6"/>
+            </a:solidFill>
+            <a:headEnd type="none" w="med" len="med"/>
+            <a:tailEnd type="arrow" w="med" len="med"/>
+          </a:ln>
+          <a:effectLst/>
+        </p:spPr>
+        <p:style>
+          <a:lnRef idx="1">
+            <a:schemeClr val="accent2"/>
+          </a:lnRef>
+          <a:fillRef idx="2">
+            <a:schemeClr val="accent2"/>
+          </a:fillRef>
+          <a:effectRef idx="1">
+            <a:schemeClr val="accent2"/>
+          </a:effectRef>
+          <a:fontRef idx="minor">
+            <a:schemeClr val="dk1"/>
+          </a:fontRef>
+        </p:style>
+      </p:cxnSp>
+      <p:sp>
+        <p:nvSpPr>
+          <p:cNvPr id="7" name="TextBox 6"/>
           <p:cNvSpPr txBox="1"/>
           <p:nvPr/>
         </p:nvSpPr>
         <p:spPr>
           <a:xfrm>
-            <a:off x="6400800" y="4535424"/>
+            <a:off x="6400800" y="4572000"/>
             <a:ext cx="256162" cy="261610"/>
           </a:xfrm>
           <a:prstGeom prst="rect">
@@ -7014,7 +7098,7 @@
             <a:r>
               <a:rPr lang="en-US" sz="1100">
                 <a:solidFill>
-                  <a:srgbClr val="5504A6"/>
+                  <a:srgbClr val="5605A6"/>
                 </a:solidFill>
               </a:rPr>
               <a:t>1</a:t>
@@ -7024,7 +7108,7 @@
       </p:sp>
       <p:sp>
         <p:nvSpPr>
-          <p:cNvPr id="98" name="TextBox 97"/>
+          <p:cNvPr id="105" name="TextBox 104"/>
           <p:cNvSpPr txBox="1"/>
           <p:nvPr/>
         </p:nvSpPr>
@@ -7047,7 +7131,40 @@
             <a:r>
               <a:rPr lang="en-US" sz="1100">
                 <a:solidFill>
-                  <a:srgbClr val="5504A6"/>
+                  <a:srgbClr val="5605A6"/>
+                </a:solidFill>
+              </a:rPr>
+              <a:t>1</a:t>
+            </a:r>
+          </a:p>
+        </p:txBody>
+      </p:sp>
+      <p:sp>
+        <p:nvSpPr>
+          <p:cNvPr id="106" name="TextBox 105"/>
+          <p:cNvSpPr txBox="1"/>
+          <p:nvPr/>
+        </p:nvSpPr>
+        <p:spPr>
+          <a:xfrm>
+            <a:off x="6400800" y="5334000"/>
+            <a:ext cx="256162" cy="261610"/>
+          </a:xfrm>
+          <a:prstGeom prst="rect">
+            <a:avLst/>
+          </a:prstGeom>
+          <a:noFill/>
+        </p:spPr>
+        <p:txBody>
+          <a:bodyPr wrap="none" rtlCol="0">
+            <a:spAutoFit/>
+          </a:bodyPr>
+          <a:lstStyle/>
+          <a:p>
+            <a:r>
+              <a:rPr lang="en-US" sz="1100">
+                <a:solidFill>
+                  <a:srgbClr val="5605A6"/>
                 </a:solidFill>
               </a:rPr>
               <a:t>1</a:t>

</xml_diff>